<commit_message>
hello world for int0x80
</commit_message>
<xml_diff>
--- a/Выполнение системных вызовов в 64.pptx
+++ b/Выполнение системных вызовов в 64.pptx
@@ -148,7 +148,7 @@
         <p:nvSpPr>
           <p:cNvPr id="2" name="Header Placeholder 1"/>
           <p:cNvSpPr>
-            <a:spLocks noGrp="1"/>
+            <a:spLocks noGrp="true"/>
           </p:cNvSpPr>
           <p:nvPr>
             <p:ph type="hdr" sz="quarter"/>
@@ -179,7 +179,7 @@
         <p:nvSpPr>
           <p:cNvPr id="3" name="Date Placeholder 2"/>
           <p:cNvSpPr>
-            <a:spLocks noGrp="1"/>
+            <a:spLocks noGrp="true"/>
           </p:cNvSpPr>
           <p:nvPr>
             <p:ph type="dt" sz="quarter" idx="1"/>
@@ -213,7 +213,7 @@
         <p:nvSpPr>
           <p:cNvPr id="4" name="Footer Placeholder 3"/>
           <p:cNvSpPr>
-            <a:spLocks noGrp="1"/>
+            <a:spLocks noGrp="true"/>
           </p:cNvSpPr>
           <p:nvPr>
             <p:ph type="ftr" sz="quarter" idx="2"/>
@@ -244,7 +244,7 @@
         <p:nvSpPr>
           <p:cNvPr id="5" name="Slide Number Placeholder 4"/>
           <p:cNvSpPr>
-            <a:spLocks noGrp="1"/>
+            <a:spLocks noGrp="true"/>
           </p:cNvSpPr>
           <p:nvPr>
             <p:ph type="sldNum" sz="quarter" idx="3"/>
@@ -306,7 +306,7 @@
         <p:nvSpPr>
           <p:cNvPr id="2" name="Header Placeholder 1"/>
           <p:cNvSpPr>
-            <a:spLocks noGrp="1"/>
+            <a:spLocks noGrp="true"/>
           </p:cNvSpPr>
           <p:nvPr>
             <p:ph type="hdr" sz="quarter"/>
@@ -337,7 +337,7 @@
         <p:nvSpPr>
           <p:cNvPr id="3" name="Slide Number Placeholder 2"/>
           <p:cNvSpPr>
-            <a:spLocks noGrp="1"/>
+            <a:spLocks noGrp="true"/>
           </p:cNvSpPr>
           <p:nvPr>
             <p:ph type="dt" idx="1"/>
@@ -371,7 +371,7 @@
         <p:nvSpPr>
           <p:cNvPr id="4" name="Slide Image Placehoder 3"/>
           <p:cNvSpPr>
-            <a:spLocks noGrp="1" noRot="1" noChangeAspect="1"/>
+            <a:spLocks noGrp="true" noRot="true" noChangeAspect="true"/>
           </p:cNvSpPr>
           <p:nvPr>
             <p:ph type="sldImg" idx="2"/>
@@ -404,7 +404,7 @@
         <p:nvSpPr>
           <p:cNvPr id="5" name="Note Placeholder 4"/>
           <p:cNvSpPr>
-            <a:spLocks noGrp="1"/>
+            <a:spLocks noGrp="true"/>
           </p:cNvSpPr>
           <p:nvPr>
             <p:ph type="body" sz="quarter" idx="3"/>
@@ -468,7 +468,7 @@
         <p:nvSpPr>
           <p:cNvPr id="6" name="Footer Placeholder 5"/>
           <p:cNvSpPr>
-            <a:spLocks noGrp="1"/>
+            <a:spLocks noGrp="true"/>
           </p:cNvSpPr>
           <p:nvPr>
             <p:ph type="ftr" sz="quarter" idx="4"/>
@@ -499,7 +499,7 @@
         <p:nvSpPr>
           <p:cNvPr id="7" name="Slide Number Placeholder 6"/>
           <p:cNvSpPr>
-            <a:spLocks noGrp="1"/>
+            <a:spLocks noGrp="true"/>
           </p:cNvSpPr>
           <p:nvPr>
             <p:ph type="sldNum" sz="quarter" idx="5"/>
@@ -648,7 +648,7 @@
         <p:nvSpPr>
           <p:cNvPr id="2" name="Title 1"/>
           <p:cNvSpPr>
-            <a:spLocks noGrp="1"/>
+            <a:spLocks noGrp="true"/>
           </p:cNvSpPr>
           <p:nvPr>
             <p:ph type="ctrTitle"/>
@@ -688,7 +688,7 @@
         <p:nvSpPr>
           <p:cNvPr id="4" name="Date Placeholder  3"/>
           <p:cNvSpPr>
-            <a:spLocks noGrp="1"/>
+            <a:spLocks noGrp="true"/>
           </p:cNvSpPr>
           <p:nvPr>
             <p:ph type="dt" sz="half" idx="10"/>
@@ -710,7 +710,7 @@
         <p:nvSpPr>
           <p:cNvPr id="5" name="Footer Placeholder 4"/>
           <p:cNvSpPr>
-            <a:spLocks noGrp="1"/>
+            <a:spLocks noGrp="true"/>
           </p:cNvSpPr>
           <p:nvPr>
             <p:ph type="ftr" sz="quarter" idx="11"/>
@@ -729,7 +729,7 @@
         <p:nvSpPr>
           <p:cNvPr id="6" name="Slide Number Placeholder 5"/>
           <p:cNvSpPr>
-            <a:spLocks noGrp="1"/>
+            <a:spLocks noGrp="true"/>
           </p:cNvSpPr>
           <p:nvPr>
             <p:ph type="sldNum" sz="quarter" idx="12"/>
@@ -751,7 +751,7 @@
         <p:nvSpPr>
           <p:cNvPr id="3" name="Subtitle 2"/>
           <p:cNvSpPr>
-            <a:spLocks noGrp="1"/>
+            <a:spLocks noGrp="true"/>
           </p:cNvSpPr>
           <p:nvPr>
             <p:ph type="subTitle" idx="1"/>
@@ -853,7 +853,7 @@
         <p:nvSpPr>
           <p:cNvPr id="3" name="Date Placeholder 2"/>
           <p:cNvSpPr>
-            <a:spLocks noGrp="1"/>
+            <a:spLocks noGrp="true"/>
           </p:cNvSpPr>
           <p:nvPr>
             <p:ph type="dt" sz="half" idx="10"/>
@@ -875,7 +875,7 @@
         <p:nvSpPr>
           <p:cNvPr id="4" name="Footer Placeholder 3"/>
           <p:cNvSpPr>
-            <a:spLocks noGrp="1"/>
+            <a:spLocks noGrp="true"/>
           </p:cNvSpPr>
           <p:nvPr>
             <p:ph type="ftr" sz="quarter" idx="11"/>
@@ -894,7 +894,7 @@
         <p:nvSpPr>
           <p:cNvPr id="5" name="Slide Number Placeholder 4"/>
           <p:cNvSpPr>
-            <a:spLocks noGrp="1"/>
+            <a:spLocks noGrp="true"/>
           </p:cNvSpPr>
           <p:nvPr>
             <p:ph type="sldNum" sz="quarter" idx="12"/>
@@ -916,7 +916,7 @@
         <p:nvSpPr>
           <p:cNvPr id="7" name="Content Placeholder 6"/>
           <p:cNvSpPr>
-            <a:spLocks noGrp="1"/>
+            <a:spLocks noGrp="true"/>
           </p:cNvSpPr>
           <p:nvPr>
             <p:ph sz="quarter" idx="13"/>
@@ -1012,7 +1012,7 @@
         <p:nvSpPr>
           <p:cNvPr id="2" name="Title 1"/>
           <p:cNvSpPr>
-            <a:spLocks noGrp="1"/>
+            <a:spLocks noGrp="true"/>
           </p:cNvSpPr>
           <p:nvPr>
             <p:ph type="title"/>
@@ -1025,7 +1025,7 @@
           </a:xfrm>
         </p:spPr>
         <p:txBody>
-          <a:bodyPr anchor="ctr" anchorCtr="0">
+          <a:bodyPr anchor="ctr" anchorCtr="false">
             <a:normAutofit/>
           </a:bodyPr>
           <a:lstStyle>
@@ -1049,7 +1049,7 @@
         <p:nvSpPr>
           <p:cNvPr id="3" name="Content Placeholder 2"/>
           <p:cNvSpPr>
-            <a:spLocks noGrp="1"/>
+            <a:spLocks noGrp="true"/>
           </p:cNvSpPr>
           <p:nvPr>
             <p:ph idx="1"/>
@@ -1173,7 +1173,7 @@
         <p:nvSpPr>
           <p:cNvPr id="4" name="Date Placeholder 3"/>
           <p:cNvSpPr>
-            <a:spLocks noGrp="1"/>
+            <a:spLocks noGrp="true"/>
           </p:cNvSpPr>
           <p:nvPr>
             <p:ph type="dt" sz="half" idx="10"/>
@@ -1195,7 +1195,7 @@
         <p:nvSpPr>
           <p:cNvPr id="5" name="Footer Placeholder 4"/>
           <p:cNvSpPr>
-            <a:spLocks noGrp="1"/>
+            <a:spLocks noGrp="true"/>
           </p:cNvSpPr>
           <p:nvPr>
             <p:ph type="ftr" sz="quarter" idx="11"/>
@@ -1214,7 +1214,7 @@
         <p:nvSpPr>
           <p:cNvPr id="6" name="Slide Number Placeholder  5"/>
           <p:cNvSpPr>
-            <a:spLocks noGrp="1"/>
+            <a:spLocks noGrp="true"/>
           </p:cNvSpPr>
           <p:nvPr>
             <p:ph type="sldNum" sz="quarter" idx="12"/>
@@ -1261,7 +1261,7 @@
         <p:nvSpPr>
           <p:cNvPr id="2" name="Title 1"/>
           <p:cNvSpPr>
-            <a:spLocks noGrp="1"/>
+            <a:spLocks noGrp="true"/>
           </p:cNvSpPr>
           <p:nvPr>
             <p:ph type="title"/>
@@ -1301,7 +1301,7 @@
         <p:nvSpPr>
           <p:cNvPr id="3" name="Text Placeholder 2"/>
           <p:cNvSpPr>
-            <a:spLocks noGrp="1"/>
+            <a:spLocks noGrp="true"/>
           </p:cNvSpPr>
           <p:nvPr>
             <p:ph type="body" idx="1"/>
@@ -1423,7 +1423,7 @@
         <p:nvSpPr>
           <p:cNvPr id="4" name="Slide Number Placeholder 3"/>
           <p:cNvSpPr>
-            <a:spLocks noGrp="1"/>
+            <a:spLocks noGrp="true"/>
           </p:cNvSpPr>
           <p:nvPr>
             <p:ph type="dt" sz="half" idx="10"/>
@@ -1445,7 +1445,7 @@
         <p:nvSpPr>
           <p:cNvPr id="5" name="Footer Placeholder 4"/>
           <p:cNvSpPr>
-            <a:spLocks noGrp="1"/>
+            <a:spLocks noGrp="true"/>
           </p:cNvSpPr>
           <p:nvPr>
             <p:ph type="ftr" sz="quarter" idx="11"/>
@@ -1464,7 +1464,7 @@
         <p:nvSpPr>
           <p:cNvPr id="6" name="Slide Number Placeholder 5"/>
           <p:cNvSpPr>
-            <a:spLocks noGrp="1"/>
+            <a:spLocks noGrp="true"/>
           </p:cNvSpPr>
           <p:nvPr>
             <p:ph type="sldNum" sz="quarter" idx="12"/>
@@ -1511,7 +1511,7 @@
         <p:nvSpPr>
           <p:cNvPr id="2" name="Title 1"/>
           <p:cNvSpPr>
-            <a:spLocks noGrp="1"/>
+            <a:spLocks noGrp="true"/>
           </p:cNvSpPr>
           <p:nvPr>
             <p:ph type="title"/>
@@ -1549,7 +1549,7 @@
         <p:nvSpPr>
           <p:cNvPr id="3" name="Content Placeholder 2"/>
           <p:cNvSpPr>
-            <a:spLocks noGrp="1"/>
+            <a:spLocks noGrp="true"/>
           </p:cNvSpPr>
           <p:nvPr>
             <p:ph sz="half" idx="1"/>
@@ -1688,7 +1688,7 @@
         <p:nvSpPr>
           <p:cNvPr id="4" name="Content Placeholder 3"/>
           <p:cNvSpPr>
-            <a:spLocks noGrp="1"/>
+            <a:spLocks noGrp="true"/>
           </p:cNvSpPr>
           <p:nvPr>
             <p:ph sz="half" idx="2"/>
@@ -1828,7 +1828,7 @@
         <p:nvSpPr>
           <p:cNvPr id="5" name="Date Placeholder 4"/>
           <p:cNvSpPr>
-            <a:spLocks noGrp="1"/>
+            <a:spLocks noGrp="true"/>
           </p:cNvSpPr>
           <p:nvPr>
             <p:ph type="dt" sz="half" idx="10"/>
@@ -1850,7 +1850,7 @@
         <p:nvSpPr>
           <p:cNvPr id="6" name="Footer Placeholder 5"/>
           <p:cNvSpPr>
-            <a:spLocks noGrp="1"/>
+            <a:spLocks noGrp="true"/>
           </p:cNvSpPr>
           <p:nvPr>
             <p:ph type="ftr" sz="quarter" idx="11"/>
@@ -1869,7 +1869,7 @@
         <p:nvSpPr>
           <p:cNvPr id="7" name="Slide Number Placeholder 6"/>
           <p:cNvSpPr>
-            <a:spLocks noGrp="1"/>
+            <a:spLocks noGrp="true"/>
           </p:cNvSpPr>
           <p:nvPr>
             <p:ph type="sldNum" sz="quarter" idx="12"/>
@@ -1916,7 +1916,7 @@
         <p:nvSpPr>
           <p:cNvPr id="2" name="Title 1"/>
           <p:cNvSpPr>
-            <a:spLocks noGrp="1"/>
+            <a:spLocks noGrp="true"/>
           </p:cNvSpPr>
           <p:nvPr>
             <p:ph type="title"/>
@@ -1950,7 +1950,7 @@
         <p:nvSpPr>
           <p:cNvPr id="3" name="Text Placeholder 2"/>
           <p:cNvSpPr>
-            <a:spLocks noGrp="1"/>
+            <a:spLocks noGrp="true"/>
           </p:cNvSpPr>
           <p:nvPr>
             <p:ph type="body" idx="1"/>
@@ -2019,7 +2019,7 @@
         <p:nvSpPr>
           <p:cNvPr id="4" name="Content Placeholder 3"/>
           <p:cNvSpPr>
-            <a:spLocks noGrp="1"/>
+            <a:spLocks noGrp="true"/>
           </p:cNvSpPr>
           <p:nvPr>
             <p:ph sz="half" idx="2"/>
@@ -2080,7 +2080,7 @@
         <p:nvSpPr>
           <p:cNvPr id="5" name="文本占位符 4"/>
           <p:cNvSpPr>
-            <a:spLocks noGrp="1"/>
+            <a:spLocks noGrp="true"/>
           </p:cNvSpPr>
           <p:nvPr>
             <p:ph type="body" sz="quarter" idx="3"/>
@@ -2149,7 +2149,7 @@
         <p:nvSpPr>
           <p:cNvPr id="6" name="内容占位符 5"/>
           <p:cNvSpPr>
-            <a:spLocks noGrp="1"/>
+            <a:spLocks noGrp="true"/>
           </p:cNvSpPr>
           <p:nvPr>
             <p:ph sz="quarter" idx="4"/>
@@ -2212,7 +2212,7 @@
         <p:nvSpPr>
           <p:cNvPr id="7" name="Date Placeholder 6"/>
           <p:cNvSpPr>
-            <a:spLocks noGrp="1"/>
+            <a:spLocks noGrp="true"/>
           </p:cNvSpPr>
           <p:nvPr>
             <p:ph type="dt" sz="half" idx="10"/>
@@ -2234,7 +2234,7 @@
         <p:nvSpPr>
           <p:cNvPr id="8" name="Footer Placeholder 7"/>
           <p:cNvSpPr>
-            <a:spLocks noGrp="1"/>
+            <a:spLocks noGrp="true"/>
           </p:cNvSpPr>
           <p:nvPr>
             <p:ph type="ftr" sz="quarter" idx="11"/>
@@ -2253,7 +2253,7 @@
         <p:nvSpPr>
           <p:cNvPr id="9" name="Slide Number Placeholder 8"/>
           <p:cNvSpPr>
-            <a:spLocks noGrp="1"/>
+            <a:spLocks noGrp="true"/>
           </p:cNvSpPr>
           <p:nvPr>
             <p:ph type="sldNum" sz="quarter" idx="12"/>
@@ -2300,7 +2300,7 @@
         <p:nvSpPr>
           <p:cNvPr id="2" name="Title 1"/>
           <p:cNvSpPr>
-            <a:spLocks noGrp="1"/>
+            <a:spLocks noGrp="true"/>
           </p:cNvSpPr>
           <p:nvPr>
             <p:ph type="title"/>
@@ -2338,7 +2338,7 @@
         <p:nvSpPr>
           <p:cNvPr id="3" name="Date Placeholder 2"/>
           <p:cNvSpPr>
-            <a:spLocks noGrp="1"/>
+            <a:spLocks noGrp="true"/>
           </p:cNvSpPr>
           <p:nvPr>
             <p:ph type="dt" sz="half" idx="10"/>
@@ -2360,7 +2360,7 @@
         <p:nvSpPr>
           <p:cNvPr id="4" name="Footer Placeholder 3"/>
           <p:cNvSpPr>
-            <a:spLocks noGrp="1"/>
+            <a:spLocks noGrp="true"/>
           </p:cNvSpPr>
           <p:nvPr>
             <p:ph type="ftr" sz="quarter" idx="11"/>
@@ -2379,7 +2379,7 @@
         <p:nvSpPr>
           <p:cNvPr id="5" name="Slide Number Placeholder 4"/>
           <p:cNvSpPr>
-            <a:spLocks noGrp="1"/>
+            <a:spLocks noGrp="true"/>
           </p:cNvSpPr>
           <p:nvPr>
             <p:ph type="sldNum" sz="quarter" idx="12"/>
@@ -2426,7 +2426,7 @@
         <p:nvSpPr>
           <p:cNvPr id="2" name="Date Placeholder 1"/>
           <p:cNvSpPr>
-            <a:spLocks noGrp="1"/>
+            <a:spLocks noGrp="true"/>
           </p:cNvSpPr>
           <p:nvPr>
             <p:ph type="dt" sz="half" idx="10"/>
@@ -2448,7 +2448,7 @@
         <p:nvSpPr>
           <p:cNvPr id="3" name="Footer Placeholder 2"/>
           <p:cNvSpPr>
-            <a:spLocks noGrp="1"/>
+            <a:spLocks noGrp="true"/>
           </p:cNvSpPr>
           <p:nvPr>
             <p:ph type="ftr" sz="quarter" idx="11"/>
@@ -2467,7 +2467,7 @@
         <p:nvSpPr>
           <p:cNvPr id="4" name="Slide Number Placeholder 3"/>
           <p:cNvSpPr>
-            <a:spLocks noGrp="1"/>
+            <a:spLocks noGrp="true"/>
           </p:cNvSpPr>
           <p:nvPr>
             <p:ph type="sldNum" sz="quarter" idx="12"/>
@@ -2514,7 +2514,7 @@
         <p:nvSpPr>
           <p:cNvPr id="2" name="Title 1"/>
           <p:cNvSpPr>
-            <a:spLocks noGrp="1"/>
+            <a:spLocks noGrp="true"/>
           </p:cNvSpPr>
           <p:nvPr>
             <p:ph type="title"/>
@@ -2527,7 +2527,7 @@
           </a:xfrm>
         </p:spPr>
         <p:txBody>
-          <a:bodyPr anchor="ctr" anchorCtr="0">
+          <a:bodyPr anchor="ctr" anchorCtr="false">
             <a:normAutofit/>
           </a:bodyPr>
           <a:lstStyle>
@@ -2552,7 +2552,7 @@
         <p:nvSpPr>
           <p:cNvPr id="3" name="Picture Placeholder 2"/>
           <p:cNvSpPr>
-            <a:spLocks noGrp="1" noChangeAspect="1"/>
+            <a:spLocks noGrp="true" noChangeAspect="true"/>
           </p:cNvSpPr>
           <p:nvPr>
             <p:ph type="pic" idx="1"/>
@@ -2613,7 +2613,7 @@
         <p:nvSpPr>
           <p:cNvPr id="4" name="Text Placeholder 3"/>
           <p:cNvSpPr>
-            <a:spLocks noGrp="1"/>
+            <a:spLocks noGrp="true"/>
           </p:cNvSpPr>
           <p:nvPr>
             <p:ph type="body" sz="half" idx="2"/>
@@ -2684,7 +2684,7 @@
         <p:nvSpPr>
           <p:cNvPr id="5" name="Date Placeholder 4"/>
           <p:cNvSpPr>
-            <a:spLocks noGrp="1"/>
+            <a:spLocks noGrp="true"/>
           </p:cNvSpPr>
           <p:nvPr>
             <p:ph type="dt" sz="half" idx="10"/>
@@ -2706,7 +2706,7 @@
         <p:nvSpPr>
           <p:cNvPr id="6" name="Footer Placeholder 5"/>
           <p:cNvSpPr>
-            <a:spLocks noGrp="1"/>
+            <a:spLocks noGrp="true"/>
           </p:cNvSpPr>
           <p:nvPr>
             <p:ph type="ftr" sz="quarter" idx="11"/>
@@ -2725,7 +2725,7 @@
         <p:nvSpPr>
           <p:cNvPr id="7" name="Slide Number Placeholder 6"/>
           <p:cNvSpPr>
-            <a:spLocks noGrp="1"/>
+            <a:spLocks noGrp="true"/>
           </p:cNvSpPr>
           <p:nvPr>
             <p:ph type="sldNum" sz="quarter" idx="12"/>
@@ -2772,7 +2772,7 @@
         <p:nvSpPr>
           <p:cNvPr id="2" name="Vertical Title 1"/>
           <p:cNvSpPr>
-            <a:spLocks noGrp="1"/>
+            <a:spLocks noGrp="true"/>
           </p:cNvSpPr>
           <p:nvPr>
             <p:ph type="title" orient="vert"/>
@@ -2806,7 +2806,7 @@
         <p:nvSpPr>
           <p:cNvPr id="3" name="Vertical Text Placeholder 2"/>
           <p:cNvSpPr>
-            <a:spLocks noGrp="1"/>
+            <a:spLocks noGrp="true"/>
           </p:cNvSpPr>
           <p:nvPr>
             <p:ph type="body" orient="vert" idx="1"/>
@@ -2867,7 +2867,7 @@
         <p:nvSpPr>
           <p:cNvPr id="4" name="Date Placeholder 3"/>
           <p:cNvSpPr>
-            <a:spLocks noGrp="1"/>
+            <a:spLocks noGrp="true"/>
           </p:cNvSpPr>
           <p:nvPr>
             <p:ph type="dt" sz="half" idx="10"/>
@@ -2889,7 +2889,7 @@
         <p:nvSpPr>
           <p:cNvPr id="5" name="Footer Placeholder 4"/>
           <p:cNvSpPr>
-            <a:spLocks noGrp="1"/>
+            <a:spLocks noGrp="true"/>
           </p:cNvSpPr>
           <p:nvPr>
             <p:ph type="ftr" sz="quarter" idx="11"/>
@@ -2908,7 +2908,7 @@
         <p:nvSpPr>
           <p:cNvPr id="6" name="Slide Number Placeholder 5"/>
           <p:cNvSpPr>
-            <a:spLocks noGrp="1"/>
+            <a:spLocks noGrp="true"/>
           </p:cNvSpPr>
           <p:nvPr>
             <p:ph type="sldNum" sz="quarter" idx="12"/>
@@ -2963,7 +2963,7 @@
         <p:nvSpPr>
           <p:cNvPr id="2" name="Title Placeholder 1"/>
           <p:cNvSpPr>
-            <a:spLocks noGrp="1"/>
+            <a:spLocks noGrp="true"/>
           </p:cNvSpPr>
           <p:nvPr>
             <p:ph type="title"/>
@@ -2996,7 +2996,7 @@
         <p:nvSpPr>
           <p:cNvPr id="3" name="Text Placeholder 2"/>
           <p:cNvSpPr>
-            <a:spLocks noGrp="1"/>
+            <a:spLocks noGrp="true"/>
           </p:cNvSpPr>
           <p:nvPr>
             <p:ph type="body" idx="1"/>
@@ -3029,7 +3029,7 @@
               </a:spcAft>
               <a:buClrTx/>
               <a:buSzTx/>
-              <a:buFont typeface="Arial" panose="020B0604020202020204" pitchFamily="34" charset="0"/>
+              <a:buFont typeface="Arial" panose="02080604020202020204" pitchFamily="34" charset="0"/>
               <a:buChar char="•"/>
               <a:defRPr/>
             </a:pPr>
@@ -3077,7 +3077,7 @@
         <p:nvSpPr>
           <p:cNvPr id="4" name="Date Placeholder 3"/>
           <p:cNvSpPr>
-            <a:spLocks noGrp="1"/>
+            <a:spLocks noGrp="true"/>
           </p:cNvSpPr>
           <p:nvPr>
             <p:ph type="dt" sz="half" idx="2"/>
@@ -3119,7 +3119,7 @@
         <p:nvSpPr>
           <p:cNvPr id="5" name="Footer Placeholder 4"/>
           <p:cNvSpPr>
-            <a:spLocks noGrp="1"/>
+            <a:spLocks noGrp="true"/>
           </p:cNvSpPr>
           <p:nvPr>
             <p:ph type="ftr" sz="quarter" idx="3"/>
@@ -3160,7 +3160,7 @@
         <p:nvSpPr>
           <p:cNvPr id="6" name="Slide Number Placeholder 5"/>
           <p:cNvSpPr>
-            <a:spLocks noGrp="1"/>
+            <a:spLocks noGrp="true"/>
           </p:cNvSpPr>
           <p:nvPr>
             <p:ph type="sldNum" sz="quarter" idx="4"/>
@@ -3248,7 +3248,7 @@
         </a:spcAft>
         <a:buClrTx/>
         <a:buSzTx/>
-        <a:buFont typeface="Arial" panose="020B0604020202020204" pitchFamily="34" charset="0"/>
+        <a:buFont typeface="Arial" panose="02080604020202020204" pitchFamily="34" charset="0"/>
         <a:buNone/>
         <a:defRPr sz="2800" b="0" kern="1200">
           <a:solidFill>
@@ -3266,7 +3266,7 @@
         <a:spcBef>
           <a:spcPts val="500"/>
         </a:spcBef>
-        <a:buFont typeface="Arial" panose="020B0604020202020204" pitchFamily="34" charset="0"/>
+        <a:buFont typeface="Arial" panose="02080604020202020204" pitchFamily="34" charset="0"/>
         <a:buChar char="•"/>
         <a:defRPr sz="2400" kern="1200" baseline="0">
           <a:solidFill>
@@ -3284,7 +3284,7 @@
         <a:spcBef>
           <a:spcPts val="500"/>
         </a:spcBef>
-        <a:buFont typeface="Arial" panose="020B0604020202020204" pitchFamily="34" charset="0"/>
+        <a:buFont typeface="Arial" panose="02080604020202020204" pitchFamily="34" charset="0"/>
         <a:buChar char="•"/>
         <a:defRPr sz="2000" kern="1200" baseline="0">
           <a:solidFill>
@@ -3303,7 +3303,7 @@
         <a:spcBef>
           <a:spcPts val="500"/>
         </a:spcBef>
-        <a:buFont typeface="Arial" panose="020B0604020202020204" pitchFamily="34" charset="0"/>
+        <a:buFont typeface="Arial" panose="02080604020202020204" pitchFamily="34" charset="0"/>
         <a:buChar char="•"/>
         <a:defRPr sz="1800" kern="1200" baseline="0">
           <a:solidFill>
@@ -3322,7 +3322,7 @@
         <a:spcBef>
           <a:spcPts val="500"/>
         </a:spcBef>
-        <a:buFont typeface="Arial" panose="020B0604020202020204" pitchFamily="34" charset="0"/>
+        <a:buFont typeface="Arial" panose="02080604020202020204" pitchFamily="34" charset="0"/>
         <a:buChar char="•"/>
         <a:defRPr sz="1800" kern="1200" baseline="0">
           <a:solidFill>
@@ -3341,7 +3341,7 @@
         <a:spcBef>
           <a:spcPts val="500"/>
         </a:spcBef>
-        <a:buFont typeface="Arial" panose="020B0604020202020204" pitchFamily="34" charset="0"/>
+        <a:buFont typeface="Arial" panose="02080604020202020204" pitchFamily="34" charset="0"/>
         <a:buChar char="•"/>
         <a:defRPr sz="1800" kern="1200">
           <a:solidFill>
@@ -3359,7 +3359,7 @@
         <a:spcBef>
           <a:spcPts val="500"/>
         </a:spcBef>
-        <a:buFont typeface="Arial" panose="020B0604020202020204" pitchFamily="34" charset="0"/>
+        <a:buFont typeface="Arial" panose="02080604020202020204" pitchFamily="34" charset="0"/>
         <a:buChar char="•"/>
         <a:defRPr sz="1800" kern="1200">
           <a:solidFill>
@@ -3377,7 +3377,7 @@
         <a:spcBef>
           <a:spcPts val="500"/>
         </a:spcBef>
-        <a:buFont typeface="Arial" panose="020B0604020202020204" pitchFamily="34" charset="0"/>
+        <a:buFont typeface="Arial" panose="02080604020202020204" pitchFamily="34" charset="0"/>
         <a:buChar char="•"/>
         <a:defRPr sz="1800" kern="1200">
           <a:solidFill>
@@ -3395,7 +3395,7 @@
         <a:spcBef>
           <a:spcPts val="500"/>
         </a:spcBef>
-        <a:buFont typeface="Arial" panose="020B0604020202020204" pitchFamily="34" charset="0"/>
+        <a:buFont typeface="Arial" panose="02080604020202020204" pitchFamily="34" charset="0"/>
         <a:buChar char="•"/>
         <a:defRPr sz="1800" kern="1200">
           <a:solidFill>
@@ -3527,7 +3527,7 @@
         <p:nvSpPr>
           <p:cNvPr id="2" name="Title 1"/>
           <p:cNvSpPr>
-            <a:spLocks noGrp="1"/>
+            <a:spLocks noGrp="true"/>
           </p:cNvSpPr>
           <p:nvPr>
             <p:ph type="ctrTitle"/>
@@ -3541,22 +3541,34 @@
         </p:spPr>
         <p:txBody>
           <a:bodyPr>
-            <a:normAutofit fontScale="90000"/>
+            <a:normAutofit/>
           </a:bodyPr>
           <a:lstStyle/>
           <a:p>
             <a:r>
-              <a:rPr lang="en-US"/>
+              <a:rPr lang="en-US" sz="3200">
+                <a:latin typeface="Noto Sans Mono Medium" panose="020B0609040504020204" charset="0"/>
+                <a:cs typeface="Noto Sans Mono Medium" panose="020B0609040504020204" charset="0"/>
+              </a:rPr>
               <a:t>Выполнение системных вызовов в 64-х разрядной среде Linux.</a:t>
             </a:r>
             <a:br>
-              <a:rPr lang="en-US"/>
+              <a:rPr lang="en-US" sz="3200">
+                <a:latin typeface="Noto Sans Mono Medium" panose="020B0609040504020204" charset="0"/>
+                <a:cs typeface="Noto Sans Mono Medium" panose="020B0609040504020204" charset="0"/>
+              </a:rPr>
             </a:br>
             <a:r>
-              <a:rPr lang="en-US"/>
+              <a:rPr lang="en-US" sz="3200">
+                <a:latin typeface="Noto Sans Mono Medium" panose="020B0609040504020204" charset="0"/>
+                <a:cs typeface="Noto Sans Mono Medium" panose="020B0609040504020204" charset="0"/>
+              </a:rPr>
               <a:t>(INTEL)</a:t>
             </a:r>
-            <a:endParaRPr lang="en-US"/>
+            <a:endParaRPr lang="en-US" sz="3200">
+              <a:latin typeface="Noto Sans Mono Medium" panose="020B0609040504020204" charset="0"/>
+              <a:cs typeface="Noto Sans Mono Medium" panose="020B0609040504020204" charset="0"/>
+            </a:endParaRPr>
           </a:p>
         </p:txBody>
       </p:sp>
@@ -3582,7 +3594,7 @@
         <p:nvSpPr>
           <p:cNvPr id="2" name="Заголовок 1"/>
           <p:cNvSpPr>
-            <a:spLocks noGrp="1"/>
+            <a:spLocks noGrp="true"/>
           </p:cNvSpPr>
           <p:nvPr>
             <p:ph type="title"/>
@@ -3604,7 +3616,7 @@
         <p:nvSpPr>
           <p:cNvPr id="3" name="Замещающее содержимое 2"/>
           <p:cNvSpPr>
-            <a:spLocks noGrp="1"/>
+            <a:spLocks noGrp="true"/>
           </p:cNvSpPr>
           <p:nvPr>
             <p:ph sz="half" idx="1"/>
@@ -3656,7 +3668,7 @@
         <p:nvSpPr>
           <p:cNvPr id="2" name="Заголовок 1"/>
           <p:cNvSpPr>
-            <a:spLocks noGrp="1"/>
+            <a:spLocks noGrp="true"/>
           </p:cNvSpPr>
           <p:nvPr>
             <p:ph type="title"/>
@@ -3667,10 +3679,16 @@
           <a:bodyPr/>
           <a:p>
             <a:r>
-              <a:rPr lang="ru-RU" altLang="ru-RU"/>
+              <a:rPr lang="ru-RU" altLang="ru-RU" sz="3200">
+                <a:latin typeface="Noto Sans Mono Medium" panose="020B0609040504020204" charset="0"/>
+                <a:cs typeface="Noto Sans Mono Medium" panose="020B0609040504020204" charset="0"/>
+              </a:rPr>
               <a:t>Что такое системный вызов?</a:t>
             </a:r>
-            <a:endParaRPr lang="en-US" altLang="ru-RU"/>
+            <a:endParaRPr lang="en-US" altLang="ru-RU" sz="3200">
+              <a:latin typeface="Noto Sans Mono Medium" panose="020B0609040504020204" charset="0"/>
+              <a:cs typeface="Noto Sans Mono Medium" panose="020B0609040504020204" charset="0"/>
+            </a:endParaRPr>
           </a:p>
         </p:txBody>
       </p:sp>
@@ -3678,7 +3696,7 @@
         <p:nvSpPr>
           <p:cNvPr id="3" name="Замещающее содержимое 2"/>
           <p:cNvSpPr>
-            <a:spLocks noGrp="1"/>
+            <a:spLocks noGrp="true"/>
           </p:cNvSpPr>
           <p:nvPr>
             <p:ph idx="1"/>
@@ -3694,10 +3712,16 @@
           <a:bodyPr/>
           <a:p>
             <a:r>
-              <a:rPr lang="ru-RU" altLang="en-US"/>
+              <a:rPr lang="ru-RU" altLang="en-US" sz="2000">
+                <a:latin typeface="Noto Sans Mono Medium" panose="020B0609040504020204" charset="0"/>
+                <a:cs typeface="Noto Sans Mono Medium" panose="020B0609040504020204" charset="0"/>
+              </a:rPr>
               <a:t>Это вызов ядра операционной системы для выполнения какого-либо кода</a:t>
             </a:r>
-            <a:endParaRPr lang="ru-RU" altLang="en-US"/>
+            <a:endParaRPr lang="ru-RU" altLang="en-US" sz="2000">
+              <a:latin typeface="Noto Sans Mono Medium" panose="020B0609040504020204" charset="0"/>
+              <a:cs typeface="Noto Sans Mono Medium" panose="020B0609040504020204" charset="0"/>
+            </a:endParaRPr>
           </a:p>
         </p:txBody>
       </p:sp>
@@ -3705,7 +3729,7 @@
         <p:nvPicPr>
           <p:cNvPr id="4" name="Изображение 3" descr="28f3f65fa823753fc67daabd4b4d3551"/>
           <p:cNvPicPr>
-            <a:picLocks noChangeAspect="1"/>
+            <a:picLocks noChangeAspect="true"/>
           </p:cNvPicPr>
           <p:nvPr/>
         </p:nvPicPr>
@@ -3747,7 +3771,7 @@
         <p:nvSpPr>
           <p:cNvPr id="2" name="Заголовок 1"/>
           <p:cNvSpPr>
-            <a:spLocks noGrp="1"/>
+            <a:spLocks noGrp="true"/>
           </p:cNvSpPr>
           <p:nvPr>
             <p:ph type="title"/>
@@ -3758,10 +3782,10 @@
           <a:bodyPr/>
           <a:p>
             <a:r>
-              <a:rPr lang="ru-RU" altLang="ru-RU"/>
+              <a:rPr lang="ru-RU" altLang="ru-RU" sz="3200"/>
               <a:t>Внутри системного вызова</a:t>
             </a:r>
-            <a:endParaRPr lang="ru-RU" altLang="ru-RU"/>
+            <a:endParaRPr lang="ru-RU" altLang="ru-RU" sz="3200"/>
           </a:p>
         </p:txBody>
       </p:sp>
@@ -3783,78 +3807,135 @@
           <a:bodyPr/>
           <a:p>
             <a:r>
-              <a:rPr lang="ru-RU" altLang="en-US"/>
+              <a:rPr lang="ru-RU" altLang="en-US" sz="2400">
+                <a:latin typeface="Noto Sans Mono Medium" panose="020B0609040504020204" charset="0"/>
+                <a:cs typeface="Noto Sans Mono Medium" panose="020B0609040504020204" charset="0"/>
+              </a:rPr>
               <a:t>1) включение защиты от чтения</a:t>
             </a:r>
             <a:r>
-              <a:rPr lang="en-US" altLang="ru-RU"/>
+              <a:rPr lang="en-US" altLang="ru-RU" sz="2400">
+                <a:latin typeface="Noto Sans Mono Medium" panose="020B0609040504020204" charset="0"/>
+                <a:cs typeface="Noto Sans Mono Medium" panose="020B0609040504020204" charset="0"/>
+              </a:rPr>
               <a:t>/</a:t>
             </a:r>
             <a:r>
-              <a:rPr lang="ru-RU" altLang="ru-RU"/>
+              <a:rPr lang="ru-RU" altLang="ru-RU" sz="2400">
+                <a:latin typeface="Noto Sans Mono Medium" panose="020B0609040504020204" charset="0"/>
+                <a:cs typeface="Noto Sans Mono Medium" panose="020B0609040504020204" charset="0"/>
+              </a:rPr>
               <a:t>записию</a:t>
             </a:r>
             <a:r>
-              <a:rPr lang="en-US" altLang="ru-RU"/>
+              <a:rPr lang="en-US" altLang="ru-RU" sz="2400">
+                <a:latin typeface="Noto Sans Mono Medium" panose="020B0609040504020204" charset="0"/>
+                <a:cs typeface="Noto Sans Mono Medium" panose="020B0609040504020204" charset="0"/>
+              </a:rPr>
               <a:t>/</a:t>
             </a:r>
             <a:r>
-              <a:rPr lang="ru-RU" altLang="ru-RU"/>
+              <a:rPr lang="ru-RU" altLang="ru-RU" sz="2400">
+                <a:latin typeface="Noto Sans Mono Medium" panose="020B0609040504020204" charset="0"/>
+                <a:cs typeface="Noto Sans Mono Medium" panose="020B0609040504020204" charset="0"/>
+              </a:rPr>
               <a:t>исполнения кода из пользовательского пространства</a:t>
             </a:r>
             <a:br>
-              <a:rPr lang="ru-RU" altLang="ru-RU"/>
+              <a:rPr lang="ru-RU" altLang="ru-RU" sz="2400">
+                <a:latin typeface="Noto Sans Mono Medium" panose="020B0609040504020204" charset="0"/>
+                <a:cs typeface="Noto Sans Mono Medium" panose="020B0609040504020204" charset="0"/>
+              </a:rPr>
             </a:br>
             <a:r>
-              <a:rPr lang="ru-RU" altLang="ru-RU"/>
+              <a:rPr lang="ru-RU" altLang="ru-RU" sz="2400">
+                <a:latin typeface="Noto Sans Mono Medium" panose="020B0609040504020204" charset="0"/>
+                <a:cs typeface="Noto Sans Mono Medium" panose="020B0609040504020204" charset="0"/>
+              </a:rPr>
               <a:t>2) пользовательский стек заменяется стеком ядра </a:t>
             </a:r>
             <a:br>
-              <a:rPr lang="ru-RU" altLang="ru-RU"/>
+              <a:rPr lang="ru-RU" altLang="ru-RU" sz="2400">
+                <a:latin typeface="Noto Sans Mono Medium" panose="020B0609040504020204" charset="0"/>
+                <a:cs typeface="Noto Sans Mono Medium" panose="020B0609040504020204" charset="0"/>
+              </a:rPr>
             </a:br>
             <a:r>
-              <a:rPr lang="ru-RU" altLang="ru-RU"/>
+              <a:rPr lang="ru-RU" altLang="ru-RU" sz="2400">
+                <a:latin typeface="Noto Sans Mono Medium" panose="020B0609040504020204" charset="0"/>
+                <a:cs typeface="Noto Sans Mono Medium" panose="020B0609040504020204" charset="0"/>
+              </a:rPr>
               <a:t>3) сохраняются специальные регистры</a:t>
             </a:r>
             <a:br>
-              <a:rPr lang="ru-RU" altLang="ru-RU"/>
+              <a:rPr lang="ru-RU" altLang="ru-RU" sz="2400">
+                <a:latin typeface="Noto Sans Mono Medium" panose="020B0609040504020204" charset="0"/>
+                <a:cs typeface="Noto Sans Mono Medium" panose="020B0609040504020204" charset="0"/>
+              </a:rPr>
             </a:br>
             <a:r>
-              <a:rPr lang="ru-RU" altLang="ru-RU"/>
+              <a:rPr lang="ru-RU" altLang="ru-RU" sz="2400">
+                <a:latin typeface="Noto Sans Mono Medium" panose="020B0609040504020204" charset="0"/>
+                <a:cs typeface="Noto Sans Mono Medium" panose="020B0609040504020204" charset="0"/>
+              </a:rPr>
               <a:t>4) выполняется обработка системного вызова</a:t>
             </a:r>
             <a:br>
-              <a:rPr lang="ru-RU" altLang="ru-RU"/>
+              <a:rPr lang="ru-RU" altLang="ru-RU" sz="2400">
+                <a:latin typeface="Noto Sans Mono Medium" panose="020B0609040504020204" charset="0"/>
+                <a:cs typeface="Noto Sans Mono Medium" panose="020B0609040504020204" charset="0"/>
+              </a:rPr>
             </a:br>
             <a:r>
-              <a:rPr lang="ru-RU" altLang="ru-RU"/>
+              <a:rPr lang="ru-RU" altLang="ru-RU" sz="2400">
+                <a:latin typeface="Noto Sans Mono Medium" panose="020B0609040504020204" charset="0"/>
+                <a:cs typeface="Noto Sans Mono Medium" panose="020B0609040504020204" charset="0"/>
+              </a:rPr>
               <a:t>5) восстанавливается стек</a:t>
             </a:r>
             <a:br>
-              <a:rPr lang="ru-RU" altLang="ru-RU"/>
+              <a:rPr lang="ru-RU" altLang="ru-RU" sz="2400">
+                <a:latin typeface="Noto Sans Mono Medium" panose="020B0609040504020204" charset="0"/>
+                <a:cs typeface="Noto Sans Mono Medium" panose="020B0609040504020204" charset="0"/>
+              </a:rPr>
             </a:br>
             <a:r>
-              <a:rPr lang="ru-RU" altLang="ru-RU"/>
+              <a:rPr lang="ru-RU" altLang="ru-RU" sz="2400">
+                <a:latin typeface="Noto Sans Mono Medium" panose="020B0609040504020204" charset="0"/>
+                <a:cs typeface="Noto Sans Mono Medium" panose="020B0609040504020204" charset="0"/>
+              </a:rPr>
               <a:t>6) восстанавливаются регистры </a:t>
             </a:r>
             <a:br>
-              <a:rPr lang="ru-RU" altLang="ru-RU"/>
+              <a:rPr lang="ru-RU" altLang="ru-RU" sz="2400">
+                <a:latin typeface="Noto Sans Mono Medium" panose="020B0609040504020204" charset="0"/>
+                <a:cs typeface="Noto Sans Mono Medium" panose="020B0609040504020204" charset="0"/>
+              </a:rPr>
             </a:br>
             <a:r>
-              <a:rPr lang="ru-RU" altLang="ru-RU"/>
+              <a:rPr lang="ru-RU" altLang="ru-RU" sz="2400">
+                <a:latin typeface="Noto Sans Mono Medium" panose="020B0609040504020204" charset="0"/>
+                <a:cs typeface="Noto Sans Mono Medium" panose="020B0609040504020204" charset="0"/>
+              </a:rPr>
               <a:t>7) защита выключается</a:t>
             </a:r>
             <a:br>
-              <a:rPr lang="ru-RU" altLang="ru-RU"/>
+              <a:rPr lang="ru-RU" altLang="ru-RU" sz="2400">
+                <a:latin typeface="Noto Sans Mono Medium" panose="020B0609040504020204" charset="0"/>
+                <a:cs typeface="Noto Sans Mono Medium" panose="020B0609040504020204" charset="0"/>
+              </a:rPr>
             </a:br>
             <a:r>
-              <a:rPr lang="ru-RU" altLang="ru-RU"/>
+              <a:rPr lang="ru-RU" altLang="ru-RU" sz="2400">
+                <a:latin typeface="Noto Sans Mono Medium" panose="020B0609040504020204" charset="0"/>
+                <a:cs typeface="Noto Sans Mono Medium" panose="020B0609040504020204" charset="0"/>
+              </a:rPr>
               <a:t>8) системный вызов заканчивается</a:t>
             </a:r>
-            <a:br>
-              <a:rPr lang="ru-RU" altLang="ru-RU"/>
-            </a:br>
-            <a:endParaRPr lang="ru-RU" altLang="ru-RU"/>
+            <a:endParaRPr lang="ru-RU" altLang="ru-RU">
+              <a:latin typeface="Noto Sans Mono Medium" panose="020B0609040504020204" charset="0"/>
+              <a:cs typeface="Noto Sans Mono Medium" panose="020B0609040504020204" charset="0"/>
+            </a:endParaRPr>
           </a:p>
         </p:txBody>
       </p:sp>
@@ -3880,7 +3961,7 @@
         <p:nvSpPr>
           <p:cNvPr id="2" name="Заголовок 1"/>
           <p:cNvSpPr>
-            <a:spLocks noGrp="1"/>
+            <a:spLocks noGrp="true"/>
           </p:cNvSpPr>
           <p:nvPr>
             <p:ph type="title"/>
@@ -3891,14 +3972,23 @@
           <a:bodyPr/>
           <a:p>
             <a:r>
-              <a:rPr lang="ru-RU" altLang="en-US"/>
+              <a:rPr lang="ru-RU" altLang="en-US" sz="3200">
+                <a:latin typeface="Noto Sans Mono Medium" panose="020B0609040504020204" charset="0"/>
+                <a:cs typeface="Noto Sans Mono Medium" panose="020B0609040504020204" charset="0"/>
+              </a:rPr>
               <a:t>Отличия от </a:t>
             </a:r>
             <a:r>
-              <a:rPr lang="en-US" altLang="en-US"/>
+              <a:rPr lang="en-US" altLang="en-US" sz="3200">
+                <a:latin typeface="Noto Sans Mono Medium" panose="020B0609040504020204" charset="0"/>
+                <a:cs typeface="Noto Sans Mono Medium" panose="020B0609040504020204" charset="0"/>
+              </a:rPr>
               <a:t>JMP, CALL</a:t>
             </a:r>
-            <a:endParaRPr lang="en-US" altLang="en-US"/>
+            <a:endParaRPr lang="en-US" altLang="en-US" sz="3200">
+              <a:latin typeface="Noto Sans Mono Medium" panose="020B0609040504020204" charset="0"/>
+              <a:cs typeface="Noto Sans Mono Medium" panose="020B0609040504020204" charset="0"/>
+            </a:endParaRPr>
           </a:p>
         </p:txBody>
       </p:sp>
@@ -3906,7 +3996,7 @@
         <p:nvSpPr>
           <p:cNvPr id="3" name="Замещающее содержимое 2"/>
           <p:cNvSpPr>
-            <a:spLocks noGrp="1"/>
+            <a:spLocks noGrp="true"/>
           </p:cNvSpPr>
           <p:nvPr>
             <p:ph idx="1"/>
@@ -3946,7 +4036,7 @@
         <p:nvSpPr>
           <p:cNvPr id="2" name="Заголовок 1"/>
           <p:cNvSpPr>
-            <a:spLocks noGrp="1"/>
+            <a:spLocks noGrp="true"/>
           </p:cNvSpPr>
           <p:nvPr>
             <p:ph type="title"/>
@@ -3968,7 +4058,7 @@
         <p:nvSpPr>
           <p:cNvPr id="3" name="Замещающее содержимое 2"/>
           <p:cNvSpPr>
-            <a:spLocks noGrp="1"/>
+            <a:spLocks noGrp="true"/>
           </p:cNvSpPr>
           <p:nvPr>
             <p:ph sz="half" idx="1"/>
@@ -3982,39 +4072,56 @@
         </p:spPr>
         <p:txBody>
           <a:bodyPr>
-            <a:normAutofit lnSpcReduction="20000"/>
+            <a:normAutofit fontScale="80000"/>
           </a:bodyPr>
           <a:p>
             <a:r>
-              <a:rPr lang="ru-RU" altLang="en-US" b="1"/>
+              <a:rPr lang="ru-RU" altLang="en-US" b="1">
+                <a:latin typeface="Noto Sans Mono Medium" panose="020B0609040504020204" charset="0"/>
+                <a:cs typeface="Noto Sans Mono Medium" panose="020B0609040504020204" charset="0"/>
+              </a:rPr>
               <a:t>Способы системных вызовов ОС </a:t>
             </a:r>
             <a:r>
-              <a:rPr lang="en-US" altLang="en-US" b="1"/>
+              <a:rPr lang="en-US" altLang="en-US" b="1">
+                <a:latin typeface="Noto Sans Mono Medium" panose="020B0609040504020204" charset="0"/>
+                <a:cs typeface="Noto Sans Mono Medium" panose="020B0609040504020204" charset="0"/>
+              </a:rPr>
               <a:t>Linux x86-64:</a:t>
             </a:r>
-            <a:endParaRPr lang="en-US" altLang="en-US" b="1"/>
+            <a:endParaRPr lang="en-US" altLang="en-US" b="1">
+              <a:latin typeface="Noto Sans Mono Medium" panose="020B0609040504020204" charset="0"/>
+              <a:cs typeface="Noto Sans Mono Medium" panose="020B0609040504020204" charset="0"/>
+            </a:endParaRPr>
           </a:p>
           <a:p>
             <a:pPr marL="457200" indent="-457200">
-              <a:buFont typeface="Arial" panose="020B0604020202020204" pitchFamily="34" charset="0"/>
+              <a:buFont typeface="Arial" panose="02080604020202020204" pitchFamily="34" charset="0"/>
               <a:buChar char="•"/>
             </a:pPr>
             <a:r>
-              <a:rPr lang="en-US" altLang="ru-RU"/>
+              <a:rPr lang="en-US" altLang="ru-RU">
+                <a:latin typeface="Noto Sans Mono Medium" panose="020B0609040504020204" charset="0"/>
+                <a:cs typeface="Noto Sans Mono Medium" panose="020B0609040504020204" charset="0"/>
+              </a:rPr>
               <a:t>int $0x80</a:t>
             </a:r>
             <a:r>
-              <a:rPr lang="ru-RU" altLang="en-US"/>
+              <a:rPr lang="ru-RU" altLang="en-US">
+                <a:latin typeface="Noto Sans Mono Medium" panose="020B0609040504020204" charset="0"/>
+                <a:cs typeface="Noto Sans Mono Medium" panose="020B0609040504020204" charset="0"/>
+              </a:rPr>
               <a:t> </a:t>
             </a:r>
             <a:r>
-              <a:rPr lang="en-US" altLang="ru-RU"/>
+              <a:rPr lang="en-US" altLang="ru-RU">
+                <a:latin typeface="Noto Sans Mono Medium" panose="020B0609040504020204" charset="0"/>
+                <a:cs typeface="Noto Sans Mono Medium" panose="020B0609040504020204" charset="0"/>
+              </a:rPr>
               <a:t>	</a:t>
             </a:r>
             <a:r>
               <a:rPr lang="ru-RU" altLang="en-US">
-                <a:ln/>
                 <a:gradFill>
                   <a:gsLst>
                     <a:gs pos="21000">
@@ -4027,31 +4134,37 @@
                   <a:lin ang="5400000"/>
                 </a:gradFill>
                 <a:effectLst/>
+                <a:latin typeface="Noto Sans Mono Medium" panose="020B0609040504020204" charset="0"/>
+                <a:cs typeface="Noto Sans Mono Medium" panose="020B0609040504020204" charset="0"/>
               </a:rPr>
               <a:t>(32 бит)</a:t>
             </a:r>
-            <a:endParaRPr lang="en-US" altLang="ru-RU"/>
+            <a:endParaRPr lang="en-US" altLang="ru-RU">
+              <a:latin typeface="Noto Sans Mono Medium" panose="020B0609040504020204" charset="0"/>
+              <a:cs typeface="Noto Sans Mono Medium" panose="020B0609040504020204" charset="0"/>
+            </a:endParaRPr>
           </a:p>
           <a:p>
             <a:pPr marL="457200" indent="-457200">
-              <a:buFont typeface="Arial" panose="020B0604020202020204" pitchFamily="34" charset="0"/>
+              <a:buFont typeface="Arial" panose="02080604020202020204" pitchFamily="34" charset="0"/>
               <a:buChar char="•"/>
             </a:pPr>
             <a:r>
-              <a:rPr lang="en-US" altLang="ru-RU"/>
+              <a:rPr lang="en-US" altLang="ru-RU">
+                <a:latin typeface="Noto Sans Mono Medium" panose="020B0609040504020204" charset="0"/>
+                <a:cs typeface="Noto Sans Mono Medium" panose="020B0609040504020204" charset="0"/>
+              </a:rPr>
               <a:t>sysenter</a:t>
             </a:r>
             <a:r>
-              <a:rPr lang="ru-RU" altLang="en-US"/>
-              <a:t> </a:t>
-            </a:r>
-            <a:r>
-              <a:rPr lang="en-US" altLang="ru-RU"/>
-              <a:t>		</a:t>
-            </a:r>
-            <a:r>
               <a:rPr lang="ru-RU" altLang="en-US">
-                <a:ln/>
+                <a:latin typeface="Noto Sans Mono Medium" panose="020B0609040504020204" charset="0"/>
+                <a:cs typeface="Noto Sans Mono Medium" panose="020B0609040504020204" charset="0"/>
+              </a:rPr>
+              <a:t>  	</a:t>
+            </a:r>
+            <a:r>
+              <a:rPr lang="ru-RU" altLang="en-US">
                 <a:gradFill>
                   <a:gsLst>
                     <a:gs pos="21000">
@@ -4064,11 +4177,12 @@
                   <a:lin ang="5400000"/>
                 </a:gradFill>
                 <a:effectLst/>
+                <a:latin typeface="Noto Sans Mono Medium" panose="020B0609040504020204" charset="0"/>
+                <a:cs typeface="Noto Sans Mono Medium" panose="020B0609040504020204" charset="0"/>
               </a:rPr>
               <a:t>(32 бит)</a:t>
             </a:r>
             <a:endParaRPr lang="en-US" altLang="ru-RU">
-              <a:ln/>
               <a:gradFill>
                 <a:gsLst>
                   <a:gs pos="21000">
@@ -4081,37 +4195,38 @@
                 <a:lin ang="5400000"/>
               </a:gradFill>
               <a:effectLst/>
+              <a:latin typeface="Noto Sans Mono Medium" panose="020B0609040504020204" charset="0"/>
+              <a:cs typeface="Noto Sans Mono Medium" panose="020B0609040504020204" charset="0"/>
             </a:endParaRPr>
           </a:p>
           <a:p>
             <a:pPr marL="457200" indent="-457200">
-              <a:buFont typeface="Arial" panose="020B0604020202020204" pitchFamily="34" charset="0"/>
+              <a:buFont typeface="Arial" panose="02080604020202020204" pitchFamily="34" charset="0"/>
               <a:buChar char="•"/>
             </a:pPr>
             <a:r>
               <a:rPr lang="en-US" altLang="ru-RU">
-                <a:latin typeface="+mj-lt"/>
-                <a:cs typeface="+mj-lt"/>
+                <a:latin typeface="Noto Sans Mono Medium" panose="020B0609040504020204" charset="0"/>
+                <a:cs typeface="Noto Sans Mono Medium" panose="020B0609040504020204" charset="0"/>
               </a:rPr>
               <a:t>syscall</a:t>
             </a:r>
             <a:r>
               <a:rPr lang="ru-RU" altLang="en-US">
-                <a:latin typeface="+mj-lt"/>
-                <a:cs typeface="+mj-lt"/>
+                <a:latin typeface="Noto Sans Mono Medium" panose="020B0609040504020204" charset="0"/>
+                <a:cs typeface="Noto Sans Mono Medium" panose="020B0609040504020204" charset="0"/>
               </a:rPr>
               <a:t> </a:t>
             </a:r>
             <a:r>
               <a:rPr lang="en-US" altLang="ru-RU">
-                <a:latin typeface="+mj-lt"/>
-                <a:cs typeface="+mj-lt"/>
+                <a:latin typeface="Noto Sans Mono Medium" panose="020B0609040504020204" charset="0"/>
+                <a:cs typeface="Noto Sans Mono Medium" panose="020B0609040504020204" charset="0"/>
               </a:rPr>
               <a:t>		</a:t>
             </a:r>
             <a:r>
               <a:rPr lang="ru-RU" altLang="en-US">
-                <a:ln/>
                 <a:gradFill>
                   <a:gsLst>
                     <a:gs pos="21000">
@@ -4124,13 +4239,12 @@
                   <a:lin ang="5400000"/>
                 </a:gradFill>
                 <a:effectLst/>
-                <a:latin typeface="+mj-lt"/>
-                <a:cs typeface="+mj-lt"/>
+                <a:latin typeface="Noto Sans Mono Medium" panose="020B0609040504020204" charset="0"/>
+                <a:cs typeface="Noto Sans Mono Medium" panose="020B0609040504020204" charset="0"/>
               </a:rPr>
               <a:t>(64 бит)</a:t>
             </a:r>
             <a:endParaRPr lang="en-US" altLang="ru-RU">
-              <a:ln/>
               <a:gradFill>
                 <a:gsLst>
                   <a:gs pos="21000">
@@ -4143,31 +4257,40 @@
                 <a:lin ang="5400000"/>
               </a:gradFill>
               <a:effectLst/>
-              <a:latin typeface="+mj-lt"/>
-              <a:cs typeface="+mj-lt"/>
+              <a:latin typeface="Noto Sans Mono Medium" panose="020B0609040504020204" charset="0"/>
+              <a:cs typeface="Noto Sans Mono Medium" panose="020B0609040504020204" charset="0"/>
             </a:endParaRPr>
           </a:p>
           <a:p>
             <a:pPr marL="457200" indent="-457200">
-              <a:buFont typeface="Arial" panose="020B0604020202020204" pitchFamily="34" charset="0"/>
+              <a:buFont typeface="Arial" panose="02080604020202020204" pitchFamily="34" charset="0"/>
               <a:buChar char="•"/>
             </a:pPr>
             <a:r>
-              <a:rPr lang="en-US" altLang="ru-RU"/>
+              <a:rPr lang="en-US" altLang="ru-RU">
+                <a:latin typeface="Noto Sans Mono Medium" panose="020B0609040504020204" charset="0"/>
+                <a:cs typeface="Noto Sans Mono Medium" panose="020B0609040504020204" charset="0"/>
+              </a:rPr>
               <a:t> ̶v̶s̶y̶s̶c̶a̶l̶l̶</a:t>
             </a:r>
             <a:endParaRPr lang="en-US" altLang="ru-RU"/>
           </a:p>
           <a:p>
             <a:pPr marL="457200" indent="-457200">
-              <a:buFont typeface="Arial" panose="020B0604020202020204" pitchFamily="34" charset="0"/>
+              <a:buFont typeface="Arial" panose="02080604020202020204" pitchFamily="34" charset="0"/>
               <a:buChar char="•"/>
             </a:pPr>
             <a:r>
-              <a:rPr lang="en-US" altLang="ru-RU"/>
+              <a:rPr lang="en-US" altLang="ru-RU">
+                <a:latin typeface="Noto Sans Mono Medium" panose="020B0609040504020204" charset="0"/>
+                <a:cs typeface="Noto Sans Mono Medium" panose="020B0609040504020204" charset="0"/>
+              </a:rPr>
               <a:t> ̶v̶D̶S̶O̶</a:t>
             </a:r>
-            <a:endParaRPr lang="en-US" altLang="ru-RU"/>
+            <a:endParaRPr lang="en-US" altLang="ru-RU">
+              <a:latin typeface="Noto Sans Mono Medium" panose="020B0609040504020204" charset="0"/>
+              <a:cs typeface="Noto Sans Mono Medium" panose="020B0609040504020204" charset="0"/>
+            </a:endParaRPr>
           </a:p>
         </p:txBody>
       </p:sp>
@@ -4175,7 +4298,7 @@
         <p:nvPicPr>
           <p:cNvPr id="4" name="Замещающее содержимое 3" descr="syscall"/>
           <p:cNvPicPr>
-            <a:picLocks noChangeAspect="1"/>
+            <a:picLocks noChangeAspect="true"/>
           </p:cNvPicPr>
           <p:nvPr>
             <p:ph sz="half" idx="2"/>
@@ -4227,7 +4350,7 @@
         <p:nvSpPr>
           <p:cNvPr id="2" name="Заголовок 1"/>
           <p:cNvSpPr>
-            <a:spLocks noGrp="1"/>
+            <a:spLocks noGrp="true"/>
           </p:cNvSpPr>
           <p:nvPr>
             <p:ph type="title"/>
@@ -4249,7 +4372,7 @@
         <p:nvSpPr>
           <p:cNvPr id="3" name="Замещающее содержимое 2"/>
           <p:cNvSpPr>
-            <a:spLocks noGrp="1"/>
+            <a:spLocks noGrp="true"/>
           </p:cNvSpPr>
           <p:nvPr>
             <p:ph sz="half" idx="1"/>
@@ -4265,47 +4388,83 @@
           <a:bodyPr/>
           <a:p>
             <a:r>
-              <a:rPr lang="ru-RU" altLang="ru-RU"/>
+              <a:rPr lang="ru-RU" altLang="ru-RU">
+                <a:latin typeface="Noto Sans Mono Medium" panose="020B0609040504020204" charset="0"/>
+                <a:cs typeface="Noto Sans Mono Medium" panose="020B0609040504020204" charset="0"/>
+              </a:rPr>
               <a:t>Интерфейс:</a:t>
             </a:r>
             <a:br>
-              <a:rPr lang="ru-RU" altLang="ru-RU"/>
+              <a:rPr lang="ru-RU" altLang="ru-RU">
+                <a:latin typeface="Noto Sans Mono Medium" panose="020B0609040504020204" charset="0"/>
+                <a:cs typeface="Noto Sans Mono Medium" panose="020B0609040504020204" charset="0"/>
+              </a:rPr>
             </a:br>
             <a:r>
-              <a:rPr lang="en-US" altLang="ru-RU"/>
+              <a:rPr lang="en-US" altLang="ru-RU">
+                <a:latin typeface="Noto Sans Mono Medium" panose="020B0609040504020204" charset="0"/>
+                <a:cs typeface="Noto Sans Mono Medium" panose="020B0609040504020204" charset="0"/>
+              </a:rPr>
               <a:t>%eax &lt;- </a:t>
             </a:r>
             <a:r>
-              <a:rPr lang="ru-RU" altLang="ru-RU"/>
+              <a:rPr lang="ru-RU" altLang="ru-RU">
+                <a:latin typeface="Noto Sans Mono Medium" panose="020B0609040504020204" charset="0"/>
+                <a:cs typeface="Noto Sans Mono Medium" panose="020B0609040504020204" charset="0"/>
+              </a:rPr>
               <a:t>номер системного вызова</a:t>
             </a:r>
             <a:br>
-              <a:rPr lang="ru-RU" altLang="ru-RU"/>
+              <a:rPr lang="ru-RU" altLang="ru-RU">
+                <a:latin typeface="Noto Sans Mono Medium" panose="020B0609040504020204" charset="0"/>
+                <a:cs typeface="Noto Sans Mono Medium" panose="020B0609040504020204" charset="0"/>
+              </a:rPr>
             </a:br>
             <a:r>
-              <a:rPr lang="ru-RU" altLang="ru-RU"/>
+              <a:rPr lang="ru-RU" altLang="ru-RU">
+                <a:latin typeface="Noto Sans Mono Medium" panose="020B0609040504020204" charset="0"/>
+                <a:cs typeface="Noto Sans Mono Medium" panose="020B0609040504020204" charset="0"/>
+              </a:rPr>
               <a:t>%ebx, %ecx, %edx, %esi, %edi, %ebp </a:t>
             </a:r>
             <a:r>
-              <a:rPr lang="en-US" altLang="ru-RU"/>
+              <a:rPr lang="en-US" altLang="ru-RU">
+                <a:latin typeface="Noto Sans Mono Medium" panose="020B0609040504020204" charset="0"/>
+                <a:cs typeface="Noto Sans Mono Medium" panose="020B0609040504020204" charset="0"/>
+              </a:rPr>
               <a:t>&lt;- </a:t>
             </a:r>
             <a:r>
-              <a:rPr lang="ru-RU" altLang="ru-RU"/>
+              <a:rPr lang="ru-RU" altLang="ru-RU">
+                <a:latin typeface="Noto Sans Mono Medium" panose="020B0609040504020204" charset="0"/>
+                <a:cs typeface="Noto Sans Mono Medium" panose="020B0609040504020204" charset="0"/>
+              </a:rPr>
               <a:t>агрументы</a:t>
             </a:r>
             <a:br>
-              <a:rPr lang="ru-RU" altLang="ru-RU"/>
+              <a:rPr lang="ru-RU" altLang="ru-RU">
+                <a:latin typeface="Noto Sans Mono Medium" panose="020B0609040504020204" charset="0"/>
+                <a:cs typeface="Noto Sans Mono Medium" panose="020B0609040504020204" charset="0"/>
+              </a:rPr>
             </a:br>
             <a:r>
-              <a:rPr lang="en-US" altLang="ru-RU"/>
+              <a:rPr lang="en-US" altLang="ru-RU">
+                <a:latin typeface="Noto Sans Mono Medium" panose="020B0609040504020204" charset="0"/>
+                <a:cs typeface="Noto Sans Mono Medium" panose="020B0609040504020204" charset="0"/>
+              </a:rPr>
               <a:t>%rax &lt;- </a:t>
             </a:r>
             <a:r>
-              <a:rPr lang="ru-RU" altLang="ru-RU"/>
+              <a:rPr lang="ru-RU" altLang="ru-RU">
+                <a:latin typeface="Noto Sans Mono Medium" panose="020B0609040504020204" charset="0"/>
+                <a:cs typeface="Noto Sans Mono Medium" panose="020B0609040504020204" charset="0"/>
+              </a:rPr>
               <a:t>результат</a:t>
             </a:r>
-            <a:endParaRPr lang="ru-RU" altLang="ru-RU"/>
+            <a:endParaRPr lang="ru-RU" altLang="ru-RU">
+              <a:latin typeface="Noto Sans Mono Medium" panose="020B0609040504020204" charset="0"/>
+              <a:cs typeface="Noto Sans Mono Medium" panose="020B0609040504020204" charset="0"/>
+            </a:endParaRPr>
           </a:p>
         </p:txBody>
       </p:sp>
@@ -4313,7 +4472,7 @@
         <p:nvSpPr>
           <p:cNvPr id="4" name="Замещающее содержимое 3"/>
           <p:cNvSpPr>
-            <a:spLocks noGrp="1"/>
+            <a:spLocks noGrp="true"/>
           </p:cNvSpPr>
           <p:nvPr>
             <p:ph sz="half" idx="2"/>
@@ -4327,21 +4486,33 @@
         </p:spPr>
         <p:txBody>
           <a:bodyPr>
-            <a:normAutofit lnSpcReduction="20000"/>
+            <a:normAutofit fontScale="90000"/>
           </a:bodyPr>
           <a:p>
             <a:r>
-              <a:rPr lang="ru-RU" altLang="en-US"/>
+              <a:rPr lang="ru-RU" altLang="en-US">
+                <a:latin typeface="Noto Sans Mono Medium" panose="020B0609040504020204" charset="0"/>
+                <a:cs typeface="Noto Sans Mono Medium" panose="020B0609040504020204" charset="0"/>
+              </a:rPr>
               <a:t>лежит в arch/x86/entry/entry_64_compat.S</a:t>
             </a:r>
             <a:br>
-              <a:rPr lang="ru-RU" altLang="en-US"/>
+              <a:rPr lang="ru-RU" altLang="en-US">
+                <a:latin typeface="Noto Sans Mono Medium" panose="020B0609040504020204" charset="0"/>
+                <a:cs typeface="Noto Sans Mono Medium" panose="020B0609040504020204" charset="0"/>
+              </a:rPr>
             </a:br>
             <a:r>
-              <a:rPr lang="ru-RU" altLang="en-US"/>
+              <a:rPr lang="ru-RU" altLang="en-US">
+                <a:latin typeface="Noto Sans Mono Medium" panose="020B0609040504020204" charset="0"/>
+                <a:cs typeface="Noto Sans Mono Medium" panose="020B0609040504020204" charset="0"/>
+              </a:rPr>
               <a:t>функция entry_INT80_compat</a:t>
             </a:r>
-            <a:endParaRPr lang="ru-RU" altLang="en-US"/>
+            <a:endParaRPr lang="ru-RU" altLang="en-US">
+              <a:latin typeface="Noto Sans Mono Medium" panose="020B0609040504020204" charset="0"/>
+              <a:cs typeface="Noto Sans Mono Medium" panose="020B0609040504020204" charset="0"/>
+            </a:endParaRPr>
           </a:p>
         </p:txBody>
       </p:sp>
@@ -4367,7 +4538,7 @@
         <p:nvSpPr>
           <p:cNvPr id="2" name="Заголовок 1"/>
           <p:cNvSpPr>
-            <a:spLocks noGrp="1"/>
+            <a:spLocks noGrp="true"/>
           </p:cNvSpPr>
           <p:nvPr>
             <p:ph type="title"/>
@@ -4389,7 +4560,7 @@
         <p:nvSpPr>
           <p:cNvPr id="3" name="Замещающее содержимое 2"/>
           <p:cNvSpPr>
-            <a:spLocks noGrp="1"/>
+            <a:spLocks noGrp="true"/>
           </p:cNvSpPr>
           <p:nvPr>
             <p:ph sz="half" idx="1"/>
@@ -4432,7 +4603,7 @@
         <p:nvPicPr>
           <p:cNvPr id="5" name="Замещающее содержимое 4"/>
           <p:cNvPicPr>
-            <a:picLocks noChangeAspect="1"/>
+            <a:picLocks noChangeAspect="true"/>
           </p:cNvPicPr>
           <p:nvPr>
             <p:ph sz="half" idx="2"/>
@@ -4476,7 +4647,7 @@
         <p:nvSpPr>
           <p:cNvPr id="2" name="Заголовок 1"/>
           <p:cNvSpPr>
-            <a:spLocks noGrp="1"/>
+            <a:spLocks noGrp="true"/>
           </p:cNvSpPr>
           <p:nvPr>
             <p:ph type="title"/>
@@ -4498,7 +4669,7 @@
         <p:nvSpPr>
           <p:cNvPr id="3" name="Замещающее содержимое 2"/>
           <p:cNvSpPr>
-            <a:spLocks noGrp="1"/>
+            <a:spLocks noGrp="true"/>
           </p:cNvSpPr>
           <p:nvPr>
             <p:ph sz="half" idx="1"/>
@@ -4512,73 +4683,127 @@
         </p:spPr>
         <p:txBody>
           <a:bodyPr>
-            <a:normAutofit fontScale="90000"/>
+            <a:normAutofit/>
           </a:bodyPr>
           <a:p>
             <a:r>
-              <a:rPr lang="ru-RU" altLang="en-US"/>
+              <a:rPr lang="ru-RU" altLang="en-US" sz="2000">
+                <a:latin typeface="Noto Sans Mono Medium" panose="020B0609040504020204" charset="0"/>
+                <a:cs typeface="Noto Sans Mono Medium" panose="020B0609040504020204" charset="0"/>
+              </a:rPr>
               <a:t>Интерфейс:</a:t>
             </a:r>
             <a:br>
-              <a:rPr lang="ru-RU" altLang="en-US"/>
+              <a:rPr lang="ru-RU" altLang="en-US" sz="2000">
+                <a:latin typeface="Noto Sans Mono Medium" panose="020B0609040504020204" charset="0"/>
+                <a:cs typeface="Noto Sans Mono Medium" panose="020B0609040504020204" charset="0"/>
+              </a:rPr>
             </a:br>
             <a:r>
-              <a:rPr lang="ru-RU" altLang="en-US"/>
+              <a:rPr lang="ru-RU" altLang="en-US" sz="2000">
+                <a:latin typeface="Noto Sans Mono Medium" panose="020B0609040504020204" charset="0"/>
+                <a:cs typeface="Noto Sans Mono Medium" panose="020B0609040504020204" charset="0"/>
+              </a:rPr>
               <a:t>кладем на стек точку возврата и агрументы</a:t>
             </a:r>
             <a:r>
-              <a:rPr lang="en-US" altLang="ru-RU"/>
+              <a:rPr lang="en-US" altLang="ru-RU" sz="2000">
+                <a:latin typeface="Noto Sans Mono Medium" panose="020B0609040504020204" charset="0"/>
+                <a:cs typeface="Noto Sans Mono Medium" panose="020B0609040504020204" charset="0"/>
+              </a:rPr>
               <a:t> (</a:t>
             </a:r>
             <a:r>
-              <a:rPr lang="ru-RU" altLang="ru-RU"/>
+              <a:rPr lang="ru-RU" altLang="ru-RU" sz="2000">
+                <a:latin typeface="Noto Sans Mono Medium" panose="020B0609040504020204" charset="0"/>
+                <a:cs typeface="Noto Sans Mono Medium" panose="020B0609040504020204" charset="0"/>
+              </a:rPr>
               <a:t>такие же как в </a:t>
             </a:r>
             <a:r>
-              <a:rPr lang="en-US" altLang="ru-RU"/>
+              <a:rPr lang="en-US" altLang="ru-RU" sz="2000">
+                <a:latin typeface="Noto Sans Mono Medium" panose="020B0609040504020204" charset="0"/>
+                <a:cs typeface="Noto Sans Mono Medium" panose="020B0609040504020204" charset="0"/>
+              </a:rPr>
               <a:t>Int $0x80)</a:t>
             </a:r>
             <a:br>
-              <a:rPr lang="ru-RU" altLang="en-US"/>
+              <a:rPr lang="ru-RU" altLang="en-US" sz="2000">
+                <a:latin typeface="Noto Sans Mono Medium" panose="020B0609040504020204" charset="0"/>
+                <a:cs typeface="Noto Sans Mono Medium" panose="020B0609040504020204" charset="0"/>
+              </a:rPr>
             </a:br>
             <a:r>
-              <a:rPr lang="ru-RU" altLang="en-US"/>
+              <a:rPr lang="ru-RU" altLang="en-US" sz="2000">
+                <a:latin typeface="Noto Sans Mono Medium" panose="020B0609040504020204" charset="0"/>
+                <a:cs typeface="Noto Sans Mono Medium" panose="020B0609040504020204" charset="0"/>
+              </a:rPr>
               <a:t>результат на стеке</a:t>
             </a:r>
             <a:br>
-              <a:rPr lang="ru-RU" altLang="en-US"/>
+              <a:rPr lang="ru-RU" altLang="en-US" sz="2000">
+                <a:latin typeface="Noto Sans Mono Medium" panose="020B0609040504020204" charset="0"/>
+                <a:cs typeface="Noto Sans Mono Medium" panose="020B0609040504020204" charset="0"/>
+              </a:rPr>
             </a:br>
             <a:br>
-              <a:rPr lang="ru-RU" altLang="en-US"/>
+              <a:rPr lang="ru-RU" altLang="en-US" sz="2000">
+                <a:latin typeface="Noto Sans Mono Medium" panose="020B0609040504020204" charset="0"/>
+                <a:cs typeface="Noto Sans Mono Medium" panose="020B0609040504020204" charset="0"/>
+              </a:rPr>
             </a:br>
             <a:r>
-              <a:rPr lang="ru-RU" altLang="en-US"/>
+              <a:rPr lang="ru-RU" altLang="en-US" sz="2000">
+                <a:latin typeface="Noto Sans Mono Medium" panose="020B0609040504020204" charset="0"/>
+                <a:cs typeface="Noto Sans Mono Medium" panose="020B0609040504020204" charset="0"/>
+              </a:rPr>
               <a:t>не забываем про </a:t>
             </a:r>
             <a:br>
-              <a:rPr lang="ru-RU" altLang="en-US"/>
+              <a:rPr lang="ru-RU" altLang="en-US" sz="2000">
+                <a:latin typeface="Noto Sans Mono Medium" panose="020B0609040504020204" charset="0"/>
+                <a:cs typeface="Noto Sans Mono Medium" panose="020B0609040504020204" charset="0"/>
+              </a:rPr>
             </a:br>
             <a:r>
-              <a:rPr lang="ru-RU" altLang="en-US"/>
+              <a:rPr lang="ru-RU" altLang="en-US" sz="2000">
+                <a:latin typeface="Noto Sans Mono Medium" panose="020B0609040504020204" charset="0"/>
+                <a:cs typeface="Noto Sans Mono Medium" panose="020B0609040504020204" charset="0"/>
+              </a:rPr>
               <a:t>movl   %</a:t>
             </a:r>
             <a:r>
-              <a:rPr lang="en-US" altLang="ru-RU"/>
+              <a:rPr lang="en-US" altLang="ru-RU" sz="2000">
+                <a:latin typeface="Noto Sans Mono Medium" panose="020B0609040504020204" charset="0"/>
+                <a:cs typeface="Noto Sans Mono Medium" panose="020B0609040504020204" charset="0"/>
+              </a:rPr>
               <a:t>r</a:t>
             </a:r>
             <a:r>
-              <a:rPr lang="ru-RU" altLang="en-US"/>
+              <a:rPr lang="ru-RU" altLang="en-US" sz="2000">
+                <a:latin typeface="Noto Sans Mono Medium" panose="020B0609040504020204" charset="0"/>
+                <a:cs typeface="Noto Sans Mono Medium" panose="020B0609040504020204" charset="0"/>
+              </a:rPr>
               <a:t>sp,%</a:t>
             </a:r>
             <a:r>
-              <a:rPr lang="en-US" altLang="ru-RU"/>
+              <a:rPr lang="en-US" altLang="ru-RU" sz="2000">
+                <a:latin typeface="Noto Sans Mono Medium" panose="020B0609040504020204" charset="0"/>
+                <a:cs typeface="Noto Sans Mono Medium" panose="020B0609040504020204" charset="0"/>
+              </a:rPr>
               <a:t>r</a:t>
             </a:r>
             <a:r>
-              <a:rPr lang="ru-RU" altLang="en-US"/>
+              <a:rPr lang="ru-RU" altLang="en-US" sz="2000">
+                <a:latin typeface="Noto Sans Mono Medium" panose="020B0609040504020204" charset="0"/>
+                <a:cs typeface="Noto Sans Mono Medium" panose="020B0609040504020204" charset="0"/>
+              </a:rPr>
               <a:t>bp</a:t>
             </a:r>
-            <a:endParaRPr lang="ru-RU" altLang="en-US"/>
+            <a:endParaRPr lang="ru-RU" altLang="en-US" sz="2000">
+              <a:latin typeface="Noto Sans Mono Medium" panose="020B0609040504020204" charset="0"/>
+              <a:cs typeface="Noto Sans Mono Medium" panose="020B0609040504020204" charset="0"/>
+            </a:endParaRPr>
           </a:p>
         </p:txBody>
       </p:sp>
@@ -4586,7 +4811,7 @@
         <p:nvSpPr>
           <p:cNvPr id="4" name="Замещающее содержимое 3"/>
           <p:cNvSpPr>
-            <a:spLocks noGrp="1"/>
+            <a:spLocks noGrp="true"/>
           </p:cNvSpPr>
           <p:nvPr>
             <p:ph sz="half" idx="2"/>
@@ -4602,23 +4827,31 @@
           <a:bodyPr/>
           <a:p>
             <a:r>
-              <a:rPr lang="ru-RU" altLang="en-US">
+              <a:rPr lang="ru-RU" altLang="en-US" sz="2400">
+                <a:latin typeface="Noto Sans Mono Medium" panose="020B0609040504020204" charset="0"/>
+                <a:cs typeface="Noto Sans Mono Medium" panose="020B0609040504020204" charset="0"/>
                 <a:sym typeface="+mn-ea"/>
               </a:rPr>
               <a:t>лежит в arch/x86/entry/entry_64_compat.S</a:t>
             </a:r>
             <a:br>
-              <a:rPr lang="ru-RU" altLang="en-US">
+              <a:rPr lang="ru-RU" altLang="en-US" sz="2400">
+                <a:latin typeface="Noto Sans Mono Medium" panose="020B0609040504020204" charset="0"/>
+                <a:cs typeface="Noto Sans Mono Medium" panose="020B0609040504020204" charset="0"/>
                 <a:sym typeface="+mn-ea"/>
               </a:rPr>
             </a:br>
             <a:r>
-              <a:rPr lang="ru-RU" altLang="en-US">
+              <a:rPr lang="ru-RU" altLang="en-US" sz="2400">
+                <a:latin typeface="Noto Sans Mono Medium" panose="020B0609040504020204" charset="0"/>
+                <a:cs typeface="Noto Sans Mono Medium" panose="020B0609040504020204" charset="0"/>
                 <a:sym typeface="+mn-ea"/>
               </a:rPr>
               <a:t>функция entry_SYSENTER_compat </a:t>
             </a:r>
-            <a:endParaRPr lang="ru-RU" altLang="en-US">
+            <a:endParaRPr lang="ru-RU" altLang="en-US" sz="2400">
+              <a:latin typeface="Noto Sans Mono Medium" panose="020B0609040504020204" charset="0"/>
+              <a:cs typeface="Noto Sans Mono Medium" panose="020B0609040504020204" charset="0"/>
               <a:sym typeface="+mn-ea"/>
             </a:endParaRPr>
           </a:p>
@@ -4646,7 +4879,7 @@
         <p:nvSpPr>
           <p:cNvPr id="2" name="Заголовок 1"/>
           <p:cNvSpPr>
-            <a:spLocks noGrp="1"/>
+            <a:spLocks noGrp="true"/>
           </p:cNvSpPr>
           <p:nvPr>
             <p:ph type="title"/>
@@ -4657,10 +4890,16 @@
           <a:bodyPr/>
           <a:p>
             <a:r>
-              <a:rPr lang="en-US" altLang="ru-RU"/>
+              <a:rPr lang="en-US" altLang="ru-RU" sz="3200">
+                <a:latin typeface="Noto Sans Mono Medium" panose="020B0609040504020204" charset="0"/>
+                <a:cs typeface="Noto Sans Mono Medium" panose="020B0609040504020204" charset="0"/>
+              </a:rPr>
               <a:t>syscall</a:t>
             </a:r>
-            <a:endParaRPr lang="en-US" altLang="ru-RU"/>
+            <a:endParaRPr lang="en-US" altLang="ru-RU" sz="3200">
+              <a:latin typeface="Noto Sans Mono Medium" panose="020B0609040504020204" charset="0"/>
+              <a:cs typeface="Noto Sans Mono Medium" panose="020B0609040504020204" charset="0"/>
+            </a:endParaRPr>
           </a:p>
         </p:txBody>
       </p:sp>
@@ -4668,7 +4907,7 @@
         <p:nvSpPr>
           <p:cNvPr id="3" name="Замещающее содержимое 2"/>
           <p:cNvSpPr>
-            <a:spLocks noGrp="1"/>
+            <a:spLocks noGrp="true"/>
           </p:cNvSpPr>
           <p:nvPr>
             <p:ph sz="half" idx="1"/>
@@ -4679,14 +4918,23 @@
           <a:bodyPr/>
           <a:p>
             <a:r>
-              <a:rPr lang="ru-RU" altLang="en-US"/>
+              <a:rPr lang="ru-RU" altLang="en-US">
+                <a:latin typeface="Noto Sans Mono Medium" panose="020B0609040504020204" charset="0"/>
+                <a:cs typeface="Noto Sans Mono Medium" panose="020B0609040504020204" charset="0"/>
+              </a:rPr>
               <a:t>интерфейс </a:t>
             </a:r>
             <a:r>
-              <a:rPr lang="en-US" altLang="en-US"/>
+              <a:rPr lang="en-US" altLang="en-US">
+                <a:latin typeface="Noto Sans Mono Medium" panose="020B0609040504020204" charset="0"/>
+                <a:cs typeface="Noto Sans Mono Medium" panose="020B0609040504020204" charset="0"/>
+              </a:rPr>
               <a:t>man syscall</a:t>
             </a:r>
-            <a:endParaRPr lang="en-US" altLang="en-US"/>
+            <a:endParaRPr lang="en-US" altLang="en-US">
+              <a:latin typeface="Noto Sans Mono Medium" panose="020B0609040504020204" charset="0"/>
+              <a:cs typeface="Noto Sans Mono Medium" panose="020B0609040504020204" charset="0"/>
+            </a:endParaRPr>
           </a:p>
         </p:txBody>
       </p:sp>
@@ -4694,7 +4942,7 @@
         <p:nvSpPr>
           <p:cNvPr id="4" name="Замещающее содержимое 3"/>
           <p:cNvSpPr>
-            <a:spLocks noGrp="1"/>
+            <a:spLocks noGrp="true"/>
           </p:cNvSpPr>
           <p:nvPr>
             <p:ph sz="half" idx="2"/>
@@ -4708,38 +4956,65 @@
         </p:spPr>
         <p:txBody>
           <a:bodyPr>
-            <a:normAutofit lnSpcReduction="10000"/>
+            <a:normAutofit fontScale="70000"/>
           </a:bodyPr>
           <a:p>
             <a:r>
-              <a:rPr lang="ru-RU" altLang="en-US"/>
+              <a:rPr lang="ru-RU" altLang="en-US">
+                <a:latin typeface="Noto Sans Mono Medium" panose="020B0609040504020204" charset="0"/>
+                <a:cs typeface="Noto Sans Mono Medium" panose="020B0609040504020204" charset="0"/>
+              </a:rPr>
               <a:t>arch/x86/entry/entry_64.S</a:t>
             </a:r>
             <a:br>
-              <a:rPr lang="ru-RU" altLang="en-US"/>
+              <a:rPr lang="ru-RU" altLang="en-US">
+                <a:latin typeface="Noto Sans Mono Medium" panose="020B0609040504020204" charset="0"/>
+                <a:cs typeface="Noto Sans Mono Medium" panose="020B0609040504020204" charset="0"/>
+              </a:rPr>
             </a:br>
             <a:r>
-              <a:rPr lang="ru-RU" altLang="en-US"/>
+              <a:rPr lang="ru-RU" altLang="en-US">
+                <a:latin typeface="Noto Sans Mono Medium" panose="020B0609040504020204" charset="0"/>
+                <a:cs typeface="Noto Sans Mono Medium" panose="020B0609040504020204" charset="0"/>
+              </a:rPr>
               <a:t>и entry_SYSCALL_64 для х64</a:t>
             </a:r>
             <a:br>
-              <a:rPr lang="ru-RU" altLang="en-US"/>
+              <a:rPr lang="ru-RU" altLang="en-US">
+                <a:latin typeface="Noto Sans Mono Medium" panose="020B0609040504020204" charset="0"/>
+                <a:cs typeface="Noto Sans Mono Medium" panose="020B0609040504020204" charset="0"/>
+              </a:rPr>
             </a:br>
             <a:br>
-              <a:rPr lang="ru-RU" altLang="en-US"/>
+              <a:rPr lang="ru-RU" altLang="en-US">
+                <a:latin typeface="Noto Sans Mono Medium" panose="020B0609040504020204" charset="0"/>
+                <a:cs typeface="Noto Sans Mono Medium" panose="020B0609040504020204" charset="0"/>
+              </a:rPr>
             </a:br>
             <a:r>
-              <a:rPr lang="ru-RU" altLang="en-US"/>
+              <a:rPr lang="ru-RU" altLang="en-US">
+                <a:latin typeface="Noto Sans Mono Medium" panose="020B0609040504020204" charset="0"/>
+                <a:cs typeface="Noto Sans Mono Medium" panose="020B0609040504020204" charset="0"/>
+              </a:rPr>
               <a:t>entry_SYSCALL_compat</a:t>
             </a:r>
             <a:br>
-              <a:rPr lang="ru-RU" altLang="en-US"/>
+              <a:rPr lang="ru-RU" altLang="en-US">
+                <a:latin typeface="Noto Sans Mono Medium" panose="020B0609040504020204" charset="0"/>
+                <a:cs typeface="Noto Sans Mono Medium" panose="020B0609040504020204" charset="0"/>
+              </a:rPr>
             </a:br>
             <a:r>
-              <a:rPr lang="ru-RU" altLang="en-US"/>
+              <a:rPr lang="ru-RU" altLang="en-US">
+                <a:latin typeface="Noto Sans Mono Medium" panose="020B0609040504020204" charset="0"/>
+                <a:cs typeface="Noto Sans Mono Medium" panose="020B0609040504020204" charset="0"/>
+              </a:rPr>
               <a:t>arch/x86/entry/entry_64_compat.S для х32</a:t>
             </a:r>
-            <a:endParaRPr altLang="en-US"/>
+            <a:endParaRPr altLang="en-US">
+              <a:latin typeface="Noto Sans Mono Medium" panose="020B0609040504020204" charset="0"/>
+              <a:cs typeface="Noto Sans Mono Medium" panose="020B0609040504020204" charset="0"/>
+            </a:endParaRPr>
           </a:p>
         </p:txBody>
       </p:sp>
@@ -4869,7 +5144,7 @@
         <a:solidFill>
           <a:schemeClr val="phClr"/>
         </a:solidFill>
-        <a:gradFill rotWithShape="1">
+        <a:gradFill rotWithShape="true">
           <a:gsLst>
             <a:gs pos="0">
               <a:schemeClr val="phClr">
@@ -4893,9 +5168,9 @@
               </a:schemeClr>
             </a:gs>
           </a:gsLst>
-          <a:lin ang="5400000" scaled="0"/>
+          <a:lin ang="5400000" scaled="false"/>
         </a:gradFill>
-        <a:gradFill rotWithShape="1">
+        <a:gradFill rotWithShape="true">
           <a:gsLst>
             <a:gs pos="0">
               <a:schemeClr val="phClr">
@@ -4919,7 +5194,7 @@
               </a:schemeClr>
             </a:gs>
           </a:gsLst>
-          <a:lin ang="5400000" scaled="0"/>
+          <a:lin ang="5400000" scaled="false"/>
         </a:gradFill>
       </a:fillStyleLst>
       <a:lnStyleLst>
@@ -4972,7 +5247,7 @@
             <a:satMod val="170000"/>
           </a:schemeClr>
         </a:solidFill>
-        <a:gradFill rotWithShape="1">
+        <a:gradFill rotWithShape="true">
           <a:gsLst>
             <a:gs pos="0">
               <a:schemeClr val="phClr">
@@ -4997,7 +5272,7 @@
               </a:schemeClr>
             </a:gs>
           </a:gsLst>
-          <a:lin ang="5400000" scaled="0"/>
+          <a:lin ang="5400000" scaled="false"/>
         </a:gradFill>
       </a:bgFillStyleLst>
     </a:fmtScheme>
@@ -5128,7 +5403,7 @@
         <a:solidFill>
           <a:schemeClr val="phClr"/>
         </a:solidFill>
-        <a:gradFill rotWithShape="1">
+        <a:gradFill rotWithShape="true">
           <a:gsLst>
             <a:gs pos="0">
               <a:schemeClr val="phClr">
@@ -5152,9 +5427,9 @@
               </a:schemeClr>
             </a:gs>
           </a:gsLst>
-          <a:lin ang="5400000" scaled="0"/>
+          <a:lin ang="5400000" scaled="false"/>
         </a:gradFill>
-        <a:gradFill rotWithShape="1">
+        <a:gradFill rotWithShape="true">
           <a:gsLst>
             <a:gs pos="0">
               <a:schemeClr val="phClr">
@@ -5178,7 +5453,7 @@
               </a:schemeClr>
             </a:gs>
           </a:gsLst>
-          <a:lin ang="5400000" scaled="0"/>
+          <a:lin ang="5400000" scaled="false"/>
         </a:gradFill>
       </a:fillStyleLst>
       <a:lnStyleLst>
@@ -5231,7 +5506,7 @@
             <a:satMod val="170000"/>
           </a:schemeClr>
         </a:solidFill>
-        <a:gradFill rotWithShape="1">
+        <a:gradFill rotWithShape="true">
           <a:gsLst>
             <a:gs pos="0">
               <a:schemeClr val="phClr">
@@ -5256,7 +5531,7 @@
               </a:schemeClr>
             </a:gs>
           </a:gsLst>
-          <a:lin ang="5400000" scaled="0"/>
+          <a:lin ang="5400000" scaled="false"/>
         </a:gradFill>
       </a:bgFillStyleLst>
     </a:fmtScheme>
@@ -5387,7 +5662,7 @@
         <a:solidFill>
           <a:schemeClr val="phClr"/>
         </a:solidFill>
-        <a:gradFill rotWithShape="1">
+        <a:gradFill rotWithShape="true">
           <a:gsLst>
             <a:gs pos="0">
               <a:schemeClr val="phClr">
@@ -5411,9 +5686,9 @@
               </a:schemeClr>
             </a:gs>
           </a:gsLst>
-          <a:lin ang="5400000" scaled="0"/>
+          <a:lin ang="5400000" scaled="false"/>
         </a:gradFill>
-        <a:gradFill rotWithShape="1">
+        <a:gradFill rotWithShape="true">
           <a:gsLst>
             <a:gs pos="0">
               <a:schemeClr val="phClr">
@@ -5437,7 +5712,7 @@
               </a:schemeClr>
             </a:gs>
           </a:gsLst>
-          <a:lin ang="5400000" scaled="0"/>
+          <a:lin ang="5400000" scaled="false"/>
         </a:gradFill>
       </a:fillStyleLst>
       <a:lnStyleLst>
@@ -5490,7 +5765,7 @@
             <a:satMod val="170000"/>
           </a:schemeClr>
         </a:solidFill>
-        <a:gradFill rotWithShape="1">
+        <a:gradFill rotWithShape="true">
           <a:gsLst>
             <a:gs pos="0">
               <a:schemeClr val="phClr">
@@ -5515,7 +5790,7 @@
               </a:schemeClr>
             </a:gs>
           </a:gsLst>
-          <a:lin ang="5400000" scaled="0"/>
+          <a:lin ang="5400000" scaled="false"/>
         </a:gradFill>
       </a:bgFillStyleLst>
     </a:fmtScheme>

</xml_diff>

<commit_message>
hello world using syscall
</commit_message>
<xml_diff>
--- a/Выполнение системных вызовов в 64.pptx
+++ b/Выполнение системных вызовов в 64.pptx
@@ -3605,10 +3605,16 @@
           <a:bodyPr/>
           <a:p>
             <a:r>
-              <a:rPr lang="ru-RU" altLang="ru-RU"/>
+              <a:rPr lang="ru-RU" altLang="ru-RU" sz="3200">
+                <a:latin typeface="Noto Sans Mono Medium" panose="020B0609040504020204" charset="0"/>
+                <a:cs typeface="Noto Sans Mono Medium" panose="020B0609040504020204" charset="0"/>
+              </a:rPr>
               <a:t>БОНУС!</a:t>
             </a:r>
-            <a:endParaRPr lang="ru-RU" altLang="ru-RU"/>
+            <a:endParaRPr lang="ru-RU" altLang="ru-RU" sz="3200">
+              <a:latin typeface="Noto Sans Mono Medium" panose="020B0609040504020204" charset="0"/>
+              <a:cs typeface="Noto Sans Mono Medium" panose="020B0609040504020204" charset="0"/>
+            </a:endParaRPr>
           </a:p>
         </p:txBody>
       </p:sp>
@@ -3627,22 +3633,37 @@
           <a:bodyPr/>
           <a:p>
             <a:r>
-              <a:rPr lang="ru-RU" altLang="en-US"/>
+              <a:rPr lang="ru-RU" altLang="en-US">
+                <a:latin typeface="Noto Sans Mono Medium" panose="020B0609040504020204" charset="0"/>
+                <a:cs typeface="Noto Sans Mono Medium" panose="020B0609040504020204" charset="0"/>
+              </a:rPr>
               <a:t>Переопределяем функцию для </a:t>
             </a:r>
             <a:r>
-              <a:rPr lang="en-US" altLang="en-US"/>
+              <a:rPr lang="en-US" altLang="en-US">
+                <a:latin typeface="Noto Sans Mono Medium" panose="020B0609040504020204" charset="0"/>
+                <a:cs typeface="Noto Sans Mono Medium" panose="020B0609040504020204" charset="0"/>
+              </a:rPr>
               <a:t>segfault </a:t>
             </a:r>
             <a:r>
-              <a:rPr lang="ru-RU" altLang="en-US"/>
+              <a:rPr lang="ru-RU" altLang="en-US">
+                <a:latin typeface="Noto Sans Mono Medium" panose="020B0609040504020204" charset="0"/>
+                <a:cs typeface="Noto Sans Mono Medium" panose="020B0609040504020204" charset="0"/>
+              </a:rPr>
               <a:t>в </a:t>
             </a:r>
             <a:r>
-              <a:rPr lang="en-US" altLang="en-US"/>
+              <a:rPr lang="en-US" altLang="en-US">
+                <a:latin typeface="Noto Sans Mono Medium" panose="020B0609040504020204" charset="0"/>
+                <a:cs typeface="Noto Sans Mono Medium" panose="020B0609040504020204" charset="0"/>
+              </a:rPr>
               <a:t>Linux</a:t>
             </a:r>
-            <a:endParaRPr lang="en-US" altLang="en-US"/>
+            <a:endParaRPr lang="en-US" altLang="en-US">
+              <a:latin typeface="Noto Sans Mono Medium" panose="020B0609040504020204" charset="0"/>
+              <a:cs typeface="Noto Sans Mono Medium" panose="020B0609040504020204" charset="0"/>
+            </a:endParaRPr>
           </a:p>
         </p:txBody>
       </p:sp>
@@ -3976,14 +3997,37 @@
                 <a:latin typeface="Noto Sans Mono Medium" panose="020B0609040504020204" charset="0"/>
                 <a:cs typeface="Noto Sans Mono Medium" panose="020B0609040504020204" charset="0"/>
               </a:rPr>
-              <a:t>Отличия от </a:t>
+              <a:t>Отличия </a:t>
             </a:r>
             <a:r>
               <a:rPr lang="en-US" altLang="en-US" sz="3200">
                 <a:latin typeface="Noto Sans Mono Medium" panose="020B0609040504020204" charset="0"/>
                 <a:cs typeface="Noto Sans Mono Medium" panose="020B0609040504020204" charset="0"/>
-              </a:rPr>
-              <a:t>JMP, CALL</a:t>
+                <a:sym typeface="+mn-ea"/>
+              </a:rPr>
+              <a:t>CALL</a:t>
+            </a:r>
+            <a:r>
+              <a:rPr lang="ru-RU" altLang="en-US" sz="3200">
+                <a:latin typeface="Noto Sans Mono Medium" panose="020B0609040504020204" charset="0"/>
+                <a:cs typeface="Noto Sans Mono Medium" panose="020B0609040504020204" charset="0"/>
+                <a:sym typeface="+mn-ea"/>
+              </a:rPr>
+              <a:t> </a:t>
+            </a:r>
+            <a:r>
+              <a:rPr lang="ru-RU" altLang="en-US" sz="3200">
+                <a:latin typeface="Noto Sans Mono Medium" panose="020B0609040504020204" charset="0"/>
+                <a:cs typeface="Noto Sans Mono Medium" panose="020B0609040504020204" charset="0"/>
+              </a:rPr>
+              <a:t>от </a:t>
+            </a:r>
+            <a:r>
+              <a:rPr lang="en-US" altLang="en-US" sz="3200">
+                <a:latin typeface="Noto Sans Mono Medium" panose="020B0609040504020204" charset="0"/>
+                <a:cs typeface="Noto Sans Mono Medium" panose="020B0609040504020204" charset="0"/>
+              </a:rPr>
+              <a:t>JMP</a:t>
             </a:r>
             <a:endParaRPr lang="en-US" altLang="en-US" sz="3200">
               <a:latin typeface="Noto Sans Mono Medium" panose="020B0609040504020204" charset="0"/>
@@ -4047,10 +4091,16 @@
           <a:bodyPr/>
           <a:p>
             <a:r>
-              <a:rPr lang="ru-RU" altLang="en-US"/>
+              <a:rPr lang="ru-RU" altLang="en-US" sz="3600">
+                <a:latin typeface="Noto Sans Mono Medium" panose="020B0609040504020204" charset="0"/>
+                <a:cs typeface="Noto Sans Mono Medium" panose="020B0609040504020204" charset="0"/>
+              </a:rPr>
               <a:t>Как же его выполнить?</a:t>
             </a:r>
-            <a:endParaRPr lang="ru-RU" altLang="en-US"/>
+            <a:endParaRPr lang="ru-RU" altLang="en-US" sz="3600">
+              <a:latin typeface="Noto Sans Mono Medium" panose="020B0609040504020204" charset="0"/>
+              <a:cs typeface="Noto Sans Mono Medium" panose="020B0609040504020204" charset="0"/>
+            </a:endParaRPr>
           </a:p>
         </p:txBody>
       </p:sp>
@@ -4361,10 +4411,16 @@
           <a:bodyPr/>
           <a:p>
             <a:r>
-              <a:rPr lang="en-US" altLang="ru-RU"/>
+              <a:rPr lang="en-US" altLang="ru-RU" sz="3600">
+                <a:latin typeface="Noto Sans Mono Medium" panose="020B0609040504020204" charset="0"/>
+                <a:cs typeface="Noto Sans Mono Medium" panose="020B0609040504020204" charset="0"/>
+              </a:rPr>
               <a:t>int $0x80</a:t>
             </a:r>
-            <a:endParaRPr lang="en-US" altLang="ru-RU"/>
+            <a:endParaRPr lang="en-US" altLang="ru-RU" sz="3600">
+              <a:latin typeface="Noto Sans Mono Medium" panose="020B0609040504020204" charset="0"/>
+              <a:cs typeface="Noto Sans Mono Medium" panose="020B0609040504020204" charset="0"/>
+            </a:endParaRPr>
           </a:p>
         </p:txBody>
       </p:sp>
@@ -4658,10 +4714,16 @@
           <a:bodyPr/>
           <a:p>
             <a:r>
-              <a:rPr lang="en-US" altLang="en-US"/>
+              <a:rPr lang="en-US" altLang="en-US" sz="3600">
+                <a:latin typeface="Noto Sans Mono Medium" panose="020B0609040504020204" charset="0"/>
+                <a:cs typeface="Noto Sans Mono Medium" panose="020B0609040504020204" charset="0"/>
+              </a:rPr>
               <a:t>sysenter</a:t>
             </a:r>
-            <a:endParaRPr lang="en-US" altLang="en-US"/>
+            <a:endParaRPr lang="en-US" altLang="en-US" sz="3600">
+              <a:latin typeface="Noto Sans Mono Medium" panose="020B0609040504020204" charset="0"/>
+              <a:cs typeface="Noto Sans Mono Medium" panose="020B0609040504020204" charset="0"/>
+            </a:endParaRPr>
           </a:p>
         </p:txBody>
       </p:sp>
@@ -4915,23 +4977,100 @@
         </p:nvSpPr>
         <p:spPr/>
         <p:txBody>
-          <a:bodyPr/>
+          <a:bodyPr>
+            <a:normAutofit lnSpcReduction="10000"/>
+          </a:bodyPr>
           <a:p>
             <a:r>
               <a:rPr lang="ru-RU" altLang="en-US">
                 <a:latin typeface="Noto Sans Mono Medium" panose="020B0609040504020204" charset="0"/>
                 <a:cs typeface="Noto Sans Mono Medium" panose="020B0609040504020204" charset="0"/>
               </a:rPr>
-              <a:t>интерфейс </a:t>
-            </a:r>
-            <a:r>
-              <a:rPr lang="en-US" altLang="en-US">
-                <a:latin typeface="Noto Sans Mono Medium" panose="020B0609040504020204" charset="0"/>
-                <a:cs typeface="Noto Sans Mono Medium" panose="020B0609040504020204" charset="0"/>
-              </a:rPr>
-              <a:t>man syscall</a:t>
-            </a:r>
-            <a:endParaRPr lang="en-US" altLang="en-US">
+              <a:t>интерфейс</a:t>
+            </a:r>
+            <a:r>
+              <a:rPr lang="" altLang="ru-RU">
+                <a:latin typeface="Noto Sans Mono Medium" panose="020B0609040504020204" charset="0"/>
+                <a:cs typeface="Noto Sans Mono Medium" panose="020B0609040504020204" charset="0"/>
+              </a:rPr>
+              <a:t>:</a:t>
+            </a:r>
+            <a:br>
+              <a:rPr lang="" altLang="ru-RU">
+                <a:latin typeface="Noto Sans Mono Medium" panose="020B0609040504020204" charset="0"/>
+                <a:cs typeface="Noto Sans Mono Medium" panose="020B0609040504020204" charset="0"/>
+              </a:rPr>
+            </a:br>
+            <a:r>
+              <a:rPr lang="" altLang="ru-RU">
+                <a:latin typeface="Noto Sans Mono Medium" panose="020B0609040504020204" charset="0"/>
+                <a:cs typeface="Noto Sans Mono Medium" panose="020B0609040504020204" charset="0"/>
+              </a:rPr>
+              <a:t>%rax -</a:t>
+            </a:r>
+            <a:r>
+              <a:rPr lang="ru-RU" altLang="">
+                <a:latin typeface="Noto Sans Mono Medium" panose="020B0609040504020204" charset="0"/>
+                <a:cs typeface="Noto Sans Mono Medium" panose="020B0609040504020204" charset="0"/>
+              </a:rPr>
+              <a:t> что хотим звать</a:t>
+            </a:r>
+            <a:br>
+              <a:rPr lang="ru-RU" altLang="">
+                <a:latin typeface="Noto Sans Mono Medium" panose="020B0609040504020204" charset="0"/>
+                <a:cs typeface="Noto Sans Mono Medium" panose="020B0609040504020204" charset="0"/>
+              </a:rPr>
+            </a:br>
+            <a:r>
+              <a:rPr lang="ru-RU" altLang="en-US">
+                <a:latin typeface="Noto Sans Mono Medium" panose="020B0609040504020204" charset="0"/>
+                <a:cs typeface="Noto Sans Mono Medium" panose="020B0609040504020204" charset="0"/>
+              </a:rPr>
+              <a:t>аргументы </a:t>
+            </a:r>
+            <a:r>
+              <a:rPr lang="ru-RU" altLang="">
+                <a:latin typeface="Noto Sans Mono Medium" panose="020B0609040504020204" charset="0"/>
+                <a:cs typeface="Noto Sans Mono Medium" panose="020B0609040504020204" charset="0"/>
+              </a:rPr>
+              <a:t>складываем в регисты, почти как в </a:t>
+            </a:r>
+            <a:r>
+              <a:rPr lang="" altLang="ru-RU">
+                <a:latin typeface="Noto Sans Mono Medium" panose="020B0609040504020204" charset="0"/>
+                <a:cs typeface="Noto Sans Mono Medium" panose="020B0609040504020204" charset="0"/>
+              </a:rPr>
+              <a:t>C ABI</a:t>
+            </a:r>
+            <a:r>
+              <a:rPr lang="ru-RU" altLang="">
+                <a:latin typeface="Noto Sans Mono Medium" panose="020B0609040504020204" charset="0"/>
+                <a:cs typeface="Noto Sans Mono Medium" panose="020B0609040504020204" charset="0"/>
+              </a:rPr>
+              <a:t>, только </a:t>
+            </a:r>
+            <a:r>
+              <a:rPr lang="" altLang="ru-RU">
+                <a:latin typeface="Noto Sans Mono Medium" panose="020B0609040504020204" charset="0"/>
+                <a:cs typeface="Noto Sans Mono Medium" panose="020B0609040504020204" charset="0"/>
+              </a:rPr>
+              <a:t>rcx </a:t>
+            </a:r>
+            <a:r>
+              <a:rPr lang="ru-RU" altLang="">
+                <a:latin typeface="Noto Sans Mono Medium" panose="020B0609040504020204" charset="0"/>
+                <a:cs typeface="Noto Sans Mono Medium" panose="020B0609040504020204" charset="0"/>
+              </a:rPr>
+              <a:t>вместо </a:t>
+            </a:r>
+            <a:r>
+              <a:rPr lang="" altLang="ru-RU">
+                <a:latin typeface="Noto Sans Mono Medium" panose="020B0609040504020204" charset="0"/>
+                <a:cs typeface="Noto Sans Mono Medium" panose="020B0609040504020204" charset="0"/>
+              </a:rPr>
+              <a:t>r10</a:t>
+            </a:r>
+            <a:endParaRPr lang="" altLang="ru-RU">
               <a:latin typeface="Noto Sans Mono Medium" panose="020B0609040504020204" charset="0"/>
               <a:cs typeface="Noto Sans Mono Medium" panose="020B0609040504020204" charset="0"/>
             </a:endParaRPr>

</xml_diff>